<commit_message>
add linear regression pseudo equation, to do more clini and CD4 counts HIV high?
</commit_message>
<xml_diff>
--- a/Reports/Guannan_1_8_2019_Cario_Project.pptx
+++ b/Reports/Guannan_1_8_2019_Cario_Project.pptx
@@ -126,6 +126,11 @@
       </a:defRPr>
     </a:lvl9pPr>
   </p:defaultTextStyle>
+  <p:extLst>
+    <p:ext uri="{EFAFB233-063F-42B5-8137-9DF3F51BA10A}">
+      <p15:sldGuideLst xmlns:p15="http://schemas.microsoft.com/office/powerpoint/2012/main"/>
+    </p:ext>
+  </p:extLst>
 </p:presentation>
 </file>
 
@@ -7608,6 +7613,282 @@
           </a:prstGeom>
         </p:spPr>
       </p:pic>
+      <p:sp>
+        <p:nvSpPr>
+          <p:cNvPr id="6" name="Content Placeholder 2">
+            <a:extLst>
+              <a:ext uri="{FF2B5EF4-FFF2-40B4-BE49-F238E27FC236}">
+                <a16:creationId xmlns:a16="http://schemas.microsoft.com/office/drawing/2014/main" id="{7067C4C8-74CB-41C7-A8FB-91680BDFB405}"/>
+              </a:ext>
+            </a:extLst>
+          </p:cNvPr>
+          <p:cNvSpPr txBox="1">
+            <a:spLocks/>
+          </p:cNvSpPr>
+          <p:nvPr/>
+        </p:nvSpPr>
+        <p:spPr>
+          <a:xfrm>
+            <a:off x="915459" y="4676318"/>
+            <a:ext cx="8596668" cy="1660588"/>
+          </a:xfrm>
+          <a:prstGeom prst="rect">
+            <a:avLst/>
+          </a:prstGeom>
+        </p:spPr>
+        <p:txBody>
+          <a:bodyPr vert="horz" lIns="91440" tIns="45720" rIns="91440" bIns="45720" rtlCol="0">
+            <a:normAutofit/>
+          </a:bodyPr>
+          <a:lstStyle>
+            <a:lvl1pPr marL="342900" indent="-342900" algn="l" defTabSz="457200" rtl="0" eaLnBrk="1" latinLnBrk="0" hangingPunct="1">
+              <a:spcBef>
+                <a:spcPts val="1000"/>
+              </a:spcBef>
+              <a:spcAft>
+                <a:spcPts val="0"/>
+              </a:spcAft>
+              <a:buClr>
+                <a:schemeClr val="accent1"/>
+              </a:buClr>
+              <a:buSzPct val="80000"/>
+              <a:buFont typeface="Wingdings 3" charset="2"/>
+              <a:buChar char=""/>
+              <a:defRPr sz="1800" kern="1200">
+                <a:solidFill>
+                  <a:schemeClr val="tx1">
+                    <a:lumMod val="75000"/>
+                    <a:lumOff val="25000"/>
+                  </a:schemeClr>
+                </a:solidFill>
+                <a:latin typeface="+mn-lt"/>
+                <a:ea typeface="+mn-ea"/>
+                <a:cs typeface="+mn-cs"/>
+              </a:defRPr>
+            </a:lvl1pPr>
+            <a:lvl2pPr marL="742950" indent="-285750" algn="l" defTabSz="457200" rtl="0" eaLnBrk="1" latinLnBrk="0" hangingPunct="1">
+              <a:spcBef>
+                <a:spcPts val="1000"/>
+              </a:spcBef>
+              <a:spcAft>
+                <a:spcPts val="0"/>
+              </a:spcAft>
+              <a:buClr>
+                <a:schemeClr val="accent1"/>
+              </a:buClr>
+              <a:buSzPct val="80000"/>
+              <a:buFont typeface="Wingdings 3" charset="2"/>
+              <a:buChar char=""/>
+              <a:defRPr sz="1600" kern="1200">
+                <a:solidFill>
+                  <a:schemeClr val="tx1">
+                    <a:lumMod val="75000"/>
+                    <a:lumOff val="25000"/>
+                  </a:schemeClr>
+                </a:solidFill>
+                <a:latin typeface="+mn-lt"/>
+                <a:ea typeface="+mn-ea"/>
+                <a:cs typeface="+mn-cs"/>
+              </a:defRPr>
+            </a:lvl2pPr>
+            <a:lvl3pPr marL="1143000" indent="-228600" algn="l" defTabSz="457200" rtl="0" eaLnBrk="1" latinLnBrk="0" hangingPunct="1">
+              <a:spcBef>
+                <a:spcPts val="1000"/>
+              </a:spcBef>
+              <a:spcAft>
+                <a:spcPts val="0"/>
+              </a:spcAft>
+              <a:buClr>
+                <a:schemeClr val="accent1"/>
+              </a:buClr>
+              <a:buSzPct val="80000"/>
+              <a:buFont typeface="Wingdings 3" charset="2"/>
+              <a:buChar char=""/>
+              <a:defRPr sz="1400" kern="1200">
+                <a:solidFill>
+                  <a:schemeClr val="tx1">
+                    <a:lumMod val="75000"/>
+                    <a:lumOff val="25000"/>
+                  </a:schemeClr>
+                </a:solidFill>
+                <a:latin typeface="+mn-lt"/>
+                <a:ea typeface="+mn-ea"/>
+                <a:cs typeface="+mn-cs"/>
+              </a:defRPr>
+            </a:lvl3pPr>
+            <a:lvl4pPr marL="1600200" indent="-228600" algn="l" defTabSz="457200" rtl="0" eaLnBrk="1" latinLnBrk="0" hangingPunct="1">
+              <a:spcBef>
+                <a:spcPts val="1000"/>
+              </a:spcBef>
+              <a:spcAft>
+                <a:spcPts val="0"/>
+              </a:spcAft>
+              <a:buClr>
+                <a:schemeClr val="accent1"/>
+              </a:buClr>
+              <a:buSzPct val="80000"/>
+              <a:buFont typeface="Wingdings 3" charset="2"/>
+              <a:buChar char=""/>
+              <a:defRPr sz="1200" kern="1200">
+                <a:solidFill>
+                  <a:schemeClr val="tx1">
+                    <a:lumMod val="75000"/>
+                    <a:lumOff val="25000"/>
+                  </a:schemeClr>
+                </a:solidFill>
+                <a:latin typeface="+mn-lt"/>
+                <a:ea typeface="+mn-ea"/>
+                <a:cs typeface="+mn-cs"/>
+              </a:defRPr>
+            </a:lvl4pPr>
+            <a:lvl5pPr marL="2057400" indent="-228600" algn="l" defTabSz="457200" rtl="0" eaLnBrk="1" latinLnBrk="0" hangingPunct="1">
+              <a:spcBef>
+                <a:spcPts val="1000"/>
+              </a:spcBef>
+              <a:spcAft>
+                <a:spcPts val="0"/>
+              </a:spcAft>
+              <a:buClr>
+                <a:schemeClr val="accent1"/>
+              </a:buClr>
+              <a:buSzPct val="80000"/>
+              <a:buFont typeface="Wingdings 3" charset="2"/>
+              <a:buChar char=""/>
+              <a:defRPr sz="1200" kern="1200">
+                <a:solidFill>
+                  <a:schemeClr val="tx1">
+                    <a:lumMod val="75000"/>
+                    <a:lumOff val="25000"/>
+                  </a:schemeClr>
+                </a:solidFill>
+                <a:latin typeface="+mn-lt"/>
+                <a:ea typeface="+mn-ea"/>
+                <a:cs typeface="+mn-cs"/>
+              </a:defRPr>
+            </a:lvl5pPr>
+            <a:lvl6pPr marL="2514600" indent="-228600" algn="l" defTabSz="457200" rtl="0" eaLnBrk="1" latinLnBrk="0" hangingPunct="1">
+              <a:spcBef>
+                <a:spcPts val="1000"/>
+              </a:spcBef>
+              <a:spcAft>
+                <a:spcPts val="0"/>
+              </a:spcAft>
+              <a:buClr>
+                <a:schemeClr val="accent1"/>
+              </a:buClr>
+              <a:buSzPct val="80000"/>
+              <a:buFont typeface="Wingdings 3" charset="2"/>
+              <a:buChar char=""/>
+              <a:defRPr sz="1200" kern="1200">
+                <a:solidFill>
+                  <a:schemeClr val="tx1">
+                    <a:lumMod val="75000"/>
+                    <a:lumOff val="25000"/>
+                  </a:schemeClr>
+                </a:solidFill>
+                <a:latin typeface="+mn-lt"/>
+                <a:ea typeface="+mn-ea"/>
+                <a:cs typeface="+mn-cs"/>
+              </a:defRPr>
+            </a:lvl6pPr>
+            <a:lvl7pPr marL="2971800" indent="-228600" algn="l" defTabSz="457200" rtl="0" eaLnBrk="1" latinLnBrk="0" hangingPunct="1">
+              <a:spcBef>
+                <a:spcPts val="1000"/>
+              </a:spcBef>
+              <a:spcAft>
+                <a:spcPts val="0"/>
+              </a:spcAft>
+              <a:buClr>
+                <a:schemeClr val="accent1"/>
+              </a:buClr>
+              <a:buSzPct val="80000"/>
+              <a:buFont typeface="Wingdings 3" charset="2"/>
+              <a:buChar char=""/>
+              <a:defRPr sz="1200" kern="1200">
+                <a:solidFill>
+                  <a:schemeClr val="tx1">
+                    <a:lumMod val="75000"/>
+                    <a:lumOff val="25000"/>
+                  </a:schemeClr>
+                </a:solidFill>
+                <a:latin typeface="+mn-lt"/>
+                <a:ea typeface="+mn-ea"/>
+                <a:cs typeface="+mn-cs"/>
+              </a:defRPr>
+            </a:lvl7pPr>
+            <a:lvl8pPr marL="3429000" indent="-228600" algn="l" defTabSz="457200" rtl="0" eaLnBrk="1" latinLnBrk="0" hangingPunct="1">
+              <a:spcBef>
+                <a:spcPts val="1000"/>
+              </a:spcBef>
+              <a:spcAft>
+                <a:spcPts val="0"/>
+              </a:spcAft>
+              <a:buClr>
+                <a:schemeClr val="accent1"/>
+              </a:buClr>
+              <a:buSzPct val="80000"/>
+              <a:buFont typeface="Wingdings 3" charset="2"/>
+              <a:buChar char=""/>
+              <a:defRPr sz="1200" kern="1200">
+                <a:solidFill>
+                  <a:schemeClr val="tx1">
+                    <a:lumMod val="75000"/>
+                    <a:lumOff val="25000"/>
+                  </a:schemeClr>
+                </a:solidFill>
+                <a:latin typeface="+mn-lt"/>
+                <a:ea typeface="+mn-ea"/>
+                <a:cs typeface="+mn-cs"/>
+              </a:defRPr>
+            </a:lvl8pPr>
+            <a:lvl9pPr marL="3886200" indent="-228600" algn="l" defTabSz="457200" rtl="0" eaLnBrk="1" latinLnBrk="0" hangingPunct="1">
+              <a:spcBef>
+                <a:spcPts val="1000"/>
+              </a:spcBef>
+              <a:spcAft>
+                <a:spcPts val="0"/>
+              </a:spcAft>
+              <a:buClr>
+                <a:schemeClr val="accent1"/>
+              </a:buClr>
+              <a:buSzPct val="80000"/>
+              <a:buFont typeface="Wingdings 3" charset="2"/>
+              <a:buChar char=""/>
+              <a:defRPr sz="1200" kern="1200">
+                <a:solidFill>
+                  <a:schemeClr val="tx1">
+                    <a:lumMod val="75000"/>
+                    <a:lumOff val="25000"/>
+                  </a:schemeClr>
+                </a:solidFill>
+                <a:latin typeface="+mn-lt"/>
+                <a:ea typeface="+mn-ea"/>
+                <a:cs typeface="+mn-cs"/>
+              </a:defRPr>
+            </a:lvl9pPr>
+          </a:lstStyle>
+          <a:p>
+            <a:r>
+              <a:rPr lang="en-US" sz="2400" dirty="0"/>
+              <a:t>Genes associated with plasma viral load, while adjusting for age and sex of participants.</a:t>
+            </a:r>
+          </a:p>
+          <a:p>
+            <a:pPr lvl="1"/>
+            <a:r>
+              <a:rPr lang="en-US" sz="1800" dirty="0"/>
+              <a:t>Transformed of normalized counts ~ plasma viral load + age + gender</a:t>
+            </a:r>
+          </a:p>
+          <a:p>
+            <a:pPr lvl="1"/>
+            <a:r>
+              <a:rPr lang="en-US" sz="1800" dirty="0"/>
+              <a:t>Summary table of the coefficient and p-value of plasma viral load.  </a:t>
+            </a:r>
+          </a:p>
+        </p:txBody>
+      </p:sp>
     </p:spTree>
     <p:extLst>
       <p:ext uri="{BB962C8B-B14F-4D97-AF65-F5344CB8AC3E}">
@@ -7838,6 +8119,282 @@
           </a:prstGeom>
         </p:spPr>
       </p:pic>
+      <p:sp>
+        <p:nvSpPr>
+          <p:cNvPr id="9" name="Content Placeholder 2">
+            <a:extLst>
+              <a:ext uri="{FF2B5EF4-FFF2-40B4-BE49-F238E27FC236}">
+                <a16:creationId xmlns:a16="http://schemas.microsoft.com/office/drawing/2014/main" id="{B3722640-8C34-4264-9720-353F777A3262}"/>
+              </a:ext>
+            </a:extLst>
+          </p:cNvPr>
+          <p:cNvSpPr txBox="1">
+            <a:spLocks/>
+          </p:cNvSpPr>
+          <p:nvPr/>
+        </p:nvSpPr>
+        <p:spPr>
+          <a:xfrm>
+            <a:off x="915459" y="4676318"/>
+            <a:ext cx="8596668" cy="1660588"/>
+          </a:xfrm>
+          <a:prstGeom prst="rect">
+            <a:avLst/>
+          </a:prstGeom>
+        </p:spPr>
+        <p:txBody>
+          <a:bodyPr vert="horz" lIns="91440" tIns="45720" rIns="91440" bIns="45720" rtlCol="0">
+            <a:normAutofit/>
+          </a:bodyPr>
+          <a:lstStyle>
+            <a:lvl1pPr marL="342900" indent="-342900" algn="l" defTabSz="457200" rtl="0" eaLnBrk="1" latinLnBrk="0" hangingPunct="1">
+              <a:spcBef>
+                <a:spcPts val="1000"/>
+              </a:spcBef>
+              <a:spcAft>
+                <a:spcPts val="0"/>
+              </a:spcAft>
+              <a:buClr>
+                <a:schemeClr val="accent1"/>
+              </a:buClr>
+              <a:buSzPct val="80000"/>
+              <a:buFont typeface="Wingdings 3" charset="2"/>
+              <a:buChar char=""/>
+              <a:defRPr sz="1800" kern="1200">
+                <a:solidFill>
+                  <a:schemeClr val="tx1">
+                    <a:lumMod val="75000"/>
+                    <a:lumOff val="25000"/>
+                  </a:schemeClr>
+                </a:solidFill>
+                <a:latin typeface="+mn-lt"/>
+                <a:ea typeface="+mn-ea"/>
+                <a:cs typeface="+mn-cs"/>
+              </a:defRPr>
+            </a:lvl1pPr>
+            <a:lvl2pPr marL="742950" indent="-285750" algn="l" defTabSz="457200" rtl="0" eaLnBrk="1" latinLnBrk="0" hangingPunct="1">
+              <a:spcBef>
+                <a:spcPts val="1000"/>
+              </a:spcBef>
+              <a:spcAft>
+                <a:spcPts val="0"/>
+              </a:spcAft>
+              <a:buClr>
+                <a:schemeClr val="accent1"/>
+              </a:buClr>
+              <a:buSzPct val="80000"/>
+              <a:buFont typeface="Wingdings 3" charset="2"/>
+              <a:buChar char=""/>
+              <a:defRPr sz="1600" kern="1200">
+                <a:solidFill>
+                  <a:schemeClr val="tx1">
+                    <a:lumMod val="75000"/>
+                    <a:lumOff val="25000"/>
+                  </a:schemeClr>
+                </a:solidFill>
+                <a:latin typeface="+mn-lt"/>
+                <a:ea typeface="+mn-ea"/>
+                <a:cs typeface="+mn-cs"/>
+              </a:defRPr>
+            </a:lvl2pPr>
+            <a:lvl3pPr marL="1143000" indent="-228600" algn="l" defTabSz="457200" rtl="0" eaLnBrk="1" latinLnBrk="0" hangingPunct="1">
+              <a:spcBef>
+                <a:spcPts val="1000"/>
+              </a:spcBef>
+              <a:spcAft>
+                <a:spcPts val="0"/>
+              </a:spcAft>
+              <a:buClr>
+                <a:schemeClr val="accent1"/>
+              </a:buClr>
+              <a:buSzPct val="80000"/>
+              <a:buFont typeface="Wingdings 3" charset="2"/>
+              <a:buChar char=""/>
+              <a:defRPr sz="1400" kern="1200">
+                <a:solidFill>
+                  <a:schemeClr val="tx1">
+                    <a:lumMod val="75000"/>
+                    <a:lumOff val="25000"/>
+                  </a:schemeClr>
+                </a:solidFill>
+                <a:latin typeface="+mn-lt"/>
+                <a:ea typeface="+mn-ea"/>
+                <a:cs typeface="+mn-cs"/>
+              </a:defRPr>
+            </a:lvl3pPr>
+            <a:lvl4pPr marL="1600200" indent="-228600" algn="l" defTabSz="457200" rtl="0" eaLnBrk="1" latinLnBrk="0" hangingPunct="1">
+              <a:spcBef>
+                <a:spcPts val="1000"/>
+              </a:spcBef>
+              <a:spcAft>
+                <a:spcPts val="0"/>
+              </a:spcAft>
+              <a:buClr>
+                <a:schemeClr val="accent1"/>
+              </a:buClr>
+              <a:buSzPct val="80000"/>
+              <a:buFont typeface="Wingdings 3" charset="2"/>
+              <a:buChar char=""/>
+              <a:defRPr sz="1200" kern="1200">
+                <a:solidFill>
+                  <a:schemeClr val="tx1">
+                    <a:lumMod val="75000"/>
+                    <a:lumOff val="25000"/>
+                  </a:schemeClr>
+                </a:solidFill>
+                <a:latin typeface="+mn-lt"/>
+                <a:ea typeface="+mn-ea"/>
+                <a:cs typeface="+mn-cs"/>
+              </a:defRPr>
+            </a:lvl4pPr>
+            <a:lvl5pPr marL="2057400" indent="-228600" algn="l" defTabSz="457200" rtl="0" eaLnBrk="1" latinLnBrk="0" hangingPunct="1">
+              <a:spcBef>
+                <a:spcPts val="1000"/>
+              </a:spcBef>
+              <a:spcAft>
+                <a:spcPts val="0"/>
+              </a:spcAft>
+              <a:buClr>
+                <a:schemeClr val="accent1"/>
+              </a:buClr>
+              <a:buSzPct val="80000"/>
+              <a:buFont typeface="Wingdings 3" charset="2"/>
+              <a:buChar char=""/>
+              <a:defRPr sz="1200" kern="1200">
+                <a:solidFill>
+                  <a:schemeClr val="tx1">
+                    <a:lumMod val="75000"/>
+                    <a:lumOff val="25000"/>
+                  </a:schemeClr>
+                </a:solidFill>
+                <a:latin typeface="+mn-lt"/>
+                <a:ea typeface="+mn-ea"/>
+                <a:cs typeface="+mn-cs"/>
+              </a:defRPr>
+            </a:lvl5pPr>
+            <a:lvl6pPr marL="2514600" indent="-228600" algn="l" defTabSz="457200" rtl="0" eaLnBrk="1" latinLnBrk="0" hangingPunct="1">
+              <a:spcBef>
+                <a:spcPts val="1000"/>
+              </a:spcBef>
+              <a:spcAft>
+                <a:spcPts val="0"/>
+              </a:spcAft>
+              <a:buClr>
+                <a:schemeClr val="accent1"/>
+              </a:buClr>
+              <a:buSzPct val="80000"/>
+              <a:buFont typeface="Wingdings 3" charset="2"/>
+              <a:buChar char=""/>
+              <a:defRPr sz="1200" kern="1200">
+                <a:solidFill>
+                  <a:schemeClr val="tx1">
+                    <a:lumMod val="75000"/>
+                    <a:lumOff val="25000"/>
+                  </a:schemeClr>
+                </a:solidFill>
+                <a:latin typeface="+mn-lt"/>
+                <a:ea typeface="+mn-ea"/>
+                <a:cs typeface="+mn-cs"/>
+              </a:defRPr>
+            </a:lvl6pPr>
+            <a:lvl7pPr marL="2971800" indent="-228600" algn="l" defTabSz="457200" rtl="0" eaLnBrk="1" latinLnBrk="0" hangingPunct="1">
+              <a:spcBef>
+                <a:spcPts val="1000"/>
+              </a:spcBef>
+              <a:spcAft>
+                <a:spcPts val="0"/>
+              </a:spcAft>
+              <a:buClr>
+                <a:schemeClr val="accent1"/>
+              </a:buClr>
+              <a:buSzPct val="80000"/>
+              <a:buFont typeface="Wingdings 3" charset="2"/>
+              <a:buChar char=""/>
+              <a:defRPr sz="1200" kern="1200">
+                <a:solidFill>
+                  <a:schemeClr val="tx1">
+                    <a:lumMod val="75000"/>
+                    <a:lumOff val="25000"/>
+                  </a:schemeClr>
+                </a:solidFill>
+                <a:latin typeface="+mn-lt"/>
+                <a:ea typeface="+mn-ea"/>
+                <a:cs typeface="+mn-cs"/>
+              </a:defRPr>
+            </a:lvl7pPr>
+            <a:lvl8pPr marL="3429000" indent="-228600" algn="l" defTabSz="457200" rtl="0" eaLnBrk="1" latinLnBrk="0" hangingPunct="1">
+              <a:spcBef>
+                <a:spcPts val="1000"/>
+              </a:spcBef>
+              <a:spcAft>
+                <a:spcPts val="0"/>
+              </a:spcAft>
+              <a:buClr>
+                <a:schemeClr val="accent1"/>
+              </a:buClr>
+              <a:buSzPct val="80000"/>
+              <a:buFont typeface="Wingdings 3" charset="2"/>
+              <a:buChar char=""/>
+              <a:defRPr sz="1200" kern="1200">
+                <a:solidFill>
+                  <a:schemeClr val="tx1">
+                    <a:lumMod val="75000"/>
+                    <a:lumOff val="25000"/>
+                  </a:schemeClr>
+                </a:solidFill>
+                <a:latin typeface="+mn-lt"/>
+                <a:ea typeface="+mn-ea"/>
+                <a:cs typeface="+mn-cs"/>
+              </a:defRPr>
+            </a:lvl8pPr>
+            <a:lvl9pPr marL="3886200" indent="-228600" algn="l" defTabSz="457200" rtl="0" eaLnBrk="1" latinLnBrk="0" hangingPunct="1">
+              <a:spcBef>
+                <a:spcPts val="1000"/>
+              </a:spcBef>
+              <a:spcAft>
+                <a:spcPts val="0"/>
+              </a:spcAft>
+              <a:buClr>
+                <a:schemeClr val="accent1"/>
+              </a:buClr>
+              <a:buSzPct val="80000"/>
+              <a:buFont typeface="Wingdings 3" charset="2"/>
+              <a:buChar char=""/>
+              <a:defRPr sz="1200" kern="1200">
+                <a:solidFill>
+                  <a:schemeClr val="tx1">
+                    <a:lumMod val="75000"/>
+                    <a:lumOff val="25000"/>
+                  </a:schemeClr>
+                </a:solidFill>
+                <a:latin typeface="+mn-lt"/>
+                <a:ea typeface="+mn-ea"/>
+                <a:cs typeface="+mn-cs"/>
+              </a:defRPr>
+            </a:lvl9pPr>
+          </a:lstStyle>
+          <a:p>
+            <a:r>
+              <a:rPr lang="en-US" sz="2400" dirty="0"/>
+              <a:t>Genes associated with CD4 counts, while adjusting for age and sex of participants.</a:t>
+            </a:r>
+          </a:p>
+          <a:p>
+            <a:pPr lvl="1"/>
+            <a:r>
+              <a:rPr lang="en-US" sz="1800" dirty="0"/>
+              <a:t>Transformed of normalized counts ~ CD4 counts + age + gender</a:t>
+            </a:r>
+          </a:p>
+          <a:p>
+            <a:pPr lvl="1"/>
+            <a:r>
+              <a:rPr lang="en-US" sz="1800" dirty="0"/>
+              <a:t>Summary table of the coefficient and p-value of CD4 counts.  </a:t>
+            </a:r>
+          </a:p>
+        </p:txBody>
+      </p:sp>
     </p:spTree>
     <p:extLst>
       <p:ext uri="{BB962C8B-B14F-4D97-AF65-F5344CB8AC3E}">
@@ -8272,9 +8829,16 @@
             </a:r>
           </a:p>
           <a:p>
+            <a:pPr lvl="1"/>
+            <a:r>
+              <a:rPr lang="en-US" sz="1800" dirty="0"/>
+              <a:t>.gif to show 3d PCA plots or just the snapshot?</a:t>
+            </a:r>
+          </a:p>
+          <a:p>
             <a:r>
               <a:rPr lang="en-US" sz="2000" dirty="0"/>
-              <a:t>.gif to show 3d PCA plots or just the snapshot?</a:t>
+              <a:t>Association with other clinical outcomes?</a:t>
             </a:r>
           </a:p>
         </p:txBody>
@@ -8634,7 +9198,13 @@
           <a:p>
             <a:r>
               <a:rPr lang="en-US" dirty="0"/>
-              <a:t>FDR 0.1 or 0.05?</a:t>
+              <a:t>FDR 0.1 or 0.05? Subset of gene lists for downstream?</a:t>
+            </a:r>
+          </a:p>
+          <a:p>
+            <a:r>
+              <a:rPr lang="en-US" dirty="0"/>
+              <a:t>CD4 counts in some HIV gut biopsies are higher than health control?</a:t>
             </a:r>
           </a:p>
         </p:txBody>

</xml_diff>

<commit_message>
plotcounts function, edgeR, log2FC cutoff
</commit_message>
<xml_diff>
--- a/Reports/Guannan_1_8_2019_Cario_Project.pptx
+++ b/Reports/Guannan_1_8_2019_Cario_Project.pptx
@@ -15,19 +15,20 @@
     <p:sldId id="274" r:id="rId9"/>
     <p:sldId id="259" r:id="rId10"/>
     <p:sldId id="260" r:id="rId11"/>
-    <p:sldId id="261" r:id="rId12"/>
-    <p:sldId id="263" r:id="rId13"/>
-    <p:sldId id="262" r:id="rId14"/>
-    <p:sldId id="264" r:id="rId15"/>
-    <p:sldId id="266" r:id="rId16"/>
-    <p:sldId id="267" r:id="rId17"/>
-    <p:sldId id="275" r:id="rId18"/>
-    <p:sldId id="276" r:id="rId19"/>
-    <p:sldId id="277" r:id="rId20"/>
-    <p:sldId id="268" r:id="rId21"/>
-    <p:sldId id="278" r:id="rId22"/>
-    <p:sldId id="265" r:id="rId23"/>
-    <p:sldId id="269" r:id="rId24"/>
+    <p:sldId id="279" r:id="rId12"/>
+    <p:sldId id="261" r:id="rId13"/>
+    <p:sldId id="263" r:id="rId14"/>
+    <p:sldId id="262" r:id="rId15"/>
+    <p:sldId id="264" r:id="rId16"/>
+    <p:sldId id="266" r:id="rId17"/>
+    <p:sldId id="267" r:id="rId18"/>
+    <p:sldId id="275" r:id="rId19"/>
+    <p:sldId id="276" r:id="rId20"/>
+    <p:sldId id="277" r:id="rId21"/>
+    <p:sldId id="268" r:id="rId22"/>
+    <p:sldId id="278" r:id="rId23"/>
+    <p:sldId id="265" r:id="rId24"/>
+    <p:sldId id="269" r:id="rId25"/>
   </p:sldIdLst>
   <p:sldSz cx="12192000" cy="6858000"/>
   <p:notesSz cx="6858000" cy="9144000"/>
@@ -880,7 +881,7 @@
             <a:fld id="{B61BEF0D-F0BB-DE4B-95CE-6DB70DBA9567}" type="datetimeFigureOut">
               <a:rPr lang="en-US" dirty="0"/>
               <a:pPr/>
-              <a:t>1/8/2019</a:t>
+              <a:t>1/15/2019</a:t>
             </a:fld>
             <a:endParaRPr lang="en-US" dirty="0"/>
           </a:p>
@@ -1128,7 +1129,7 @@
             <a:fld id="{B61BEF0D-F0BB-DE4B-95CE-6DB70DBA9567}" type="datetimeFigureOut">
               <a:rPr lang="en-US" dirty="0"/>
               <a:pPr/>
-              <a:t>1/8/2019</a:t>
+              <a:t>1/15/2019</a:t>
             </a:fld>
             <a:endParaRPr lang="en-US" dirty="0"/>
           </a:p>
@@ -1439,7 +1440,7 @@
             <a:fld id="{B61BEF0D-F0BB-DE4B-95CE-6DB70DBA9567}" type="datetimeFigureOut">
               <a:rPr lang="en-US" dirty="0"/>
               <a:pPr/>
-              <a:t>1/8/2019</a:t>
+              <a:t>1/15/2019</a:t>
             </a:fld>
             <a:endParaRPr lang="en-US" dirty="0"/>
           </a:p>
@@ -1769,7 +1770,7 @@
             <a:fld id="{B61BEF0D-F0BB-DE4B-95CE-6DB70DBA9567}" type="datetimeFigureOut">
               <a:rPr lang="en-US" dirty="0"/>
               <a:pPr/>
-              <a:t>1/8/2019</a:t>
+              <a:t>1/15/2019</a:t>
             </a:fld>
             <a:endParaRPr lang="en-US" dirty="0"/>
           </a:p>
@@ -2080,7 +2081,7 @@
             <a:fld id="{B61BEF0D-F0BB-DE4B-95CE-6DB70DBA9567}" type="datetimeFigureOut">
               <a:rPr lang="en-US" dirty="0"/>
               <a:pPr/>
-              <a:t>1/8/2019</a:t>
+              <a:t>1/15/2019</a:t>
             </a:fld>
             <a:endParaRPr lang="en-US" dirty="0"/>
           </a:p>
@@ -2470,7 +2471,7 @@
             <a:fld id="{B61BEF0D-F0BB-DE4B-95CE-6DB70DBA9567}" type="datetimeFigureOut">
               <a:rPr lang="en-US" dirty="0"/>
               <a:pPr/>
-              <a:t>1/8/2019</a:t>
+              <a:t>1/15/2019</a:t>
             </a:fld>
             <a:endParaRPr lang="en-US" dirty="0"/>
           </a:p>
@@ -2636,7 +2637,7 @@
           <a:p>
             <a:fld id="{55C6B4A9-1611-4792-9094-5F34BCA07E0B}" type="datetimeFigureOut">
               <a:rPr lang="en-US" dirty="0"/>
-              <a:t>1/8/2019</a:t>
+              <a:t>1/15/2019</a:t>
             </a:fld>
             <a:endParaRPr lang="en-US" dirty="0"/>
           </a:p>
@@ -2812,7 +2813,7 @@
             <a:fld id="{B61BEF0D-F0BB-DE4B-95CE-6DB70DBA9567}" type="datetimeFigureOut">
               <a:rPr lang="en-US" dirty="0"/>
               <a:pPr/>
-              <a:t>1/8/2019</a:t>
+              <a:t>1/15/2019</a:t>
             </a:fld>
             <a:endParaRPr lang="en-US" dirty="0"/>
           </a:p>
@@ -2978,7 +2979,7 @@
           <a:p>
             <a:fld id="{42A54C80-263E-416B-A8E0-580EDEADCBDC}" type="datetimeFigureOut">
               <a:rPr lang="en-US" dirty="0"/>
-              <a:t>1/8/2019</a:t>
+              <a:t>1/15/2019</a:t>
             </a:fld>
             <a:endParaRPr lang="en-US" dirty="0"/>
           </a:p>
@@ -3221,7 +3222,7 @@
             <a:fld id="{B61BEF0D-F0BB-DE4B-95CE-6DB70DBA9567}" type="datetimeFigureOut">
               <a:rPr lang="en-US" dirty="0"/>
               <a:pPr/>
-              <a:t>1/8/2019</a:t>
+              <a:t>1/15/2019</a:t>
             </a:fld>
             <a:endParaRPr lang="en-US" dirty="0"/>
           </a:p>
@@ -3449,7 +3450,7 @@
           <a:p>
             <a:fld id="{42A54C80-263E-416B-A8E0-580EDEADCBDC}" type="datetimeFigureOut">
               <a:rPr lang="en-US" dirty="0"/>
-              <a:t>1/8/2019</a:t>
+              <a:t>1/15/2019</a:t>
             </a:fld>
             <a:endParaRPr lang="en-US" dirty="0"/>
           </a:p>
@@ -3819,7 +3820,7 @@
             <a:fld id="{B61BEF0D-F0BB-DE4B-95CE-6DB70DBA9567}" type="datetimeFigureOut">
               <a:rPr lang="en-US" dirty="0"/>
               <a:pPr/>
-              <a:t>1/8/2019</a:t>
+              <a:t>1/15/2019</a:t>
             </a:fld>
             <a:endParaRPr lang="en-US" dirty="0"/>
           </a:p>
@@ -3939,7 +3940,7 @@
             <a:fld id="{B61BEF0D-F0BB-DE4B-95CE-6DB70DBA9567}" type="datetimeFigureOut">
               <a:rPr lang="en-US" dirty="0"/>
               <a:pPr/>
-              <a:t>1/8/2019</a:t>
+              <a:t>1/15/2019</a:t>
             </a:fld>
             <a:endParaRPr lang="en-US" dirty="0"/>
           </a:p>
@@ -4031,7 +4032,7 @@
             <a:fld id="{B61BEF0D-F0BB-DE4B-95CE-6DB70DBA9567}" type="datetimeFigureOut">
               <a:rPr lang="en-US" dirty="0"/>
               <a:pPr/>
-              <a:t>1/8/2019</a:t>
+              <a:t>1/15/2019</a:t>
             </a:fld>
             <a:endParaRPr lang="en-US" dirty="0"/>
           </a:p>
@@ -4282,7 +4283,7 @@
           <a:p>
             <a:fld id="{42A54C80-263E-416B-A8E0-580EDEADCBDC}" type="datetimeFigureOut">
               <a:rPr lang="en-US" dirty="0"/>
-              <a:t>1/8/2019</a:t>
+              <a:t>1/15/2019</a:t>
             </a:fld>
             <a:endParaRPr lang="en-US" dirty="0"/>
           </a:p>
@@ -4584,7 +4585,7 @@
             <a:fld id="{B61BEF0D-F0BB-DE4B-95CE-6DB70DBA9567}" type="datetimeFigureOut">
               <a:rPr lang="en-US" dirty="0"/>
               <a:pPr/>
-              <a:t>1/8/2019</a:t>
+              <a:t>1/15/2019</a:t>
             </a:fld>
             <a:endParaRPr lang="en-US" dirty="0"/>
           </a:p>
@@ -5282,7 +5283,7 @@
             <a:fld id="{B61BEF0D-F0BB-DE4B-95CE-6DB70DBA9567}" type="datetimeFigureOut">
               <a:rPr lang="en-US" dirty="0"/>
               <a:pPr/>
-              <a:t>1/8/2019</a:t>
+              <a:t>1/15/2019</a:t>
             </a:fld>
             <a:endParaRPr lang="en-US" dirty="0"/>
           </a:p>
@@ -5936,7 +5937,7 @@
           <a:p>
             <a:r>
               <a:rPr lang="en-US" sz="4400" dirty="0"/>
-              <a:t>Normalization</a:t>
+              <a:t>Normalization: DESeq2</a:t>
             </a:r>
           </a:p>
         </p:txBody>
@@ -5983,13 +5984,10 @@
           <a:p>
             <a:r>
               <a:rPr lang="en-US" dirty="0"/>
-              <a:t>DESeq2 results were shown here. (TMM and downstream were also generated, not shown here)</a:t>
-            </a:r>
-          </a:p>
-          <a:p>
-            <a:pPr lvl="0">
-              <a:buChar char="•"/>
-            </a:pPr>
+              <a:t>DESeq2 </a:t>
+            </a:r>
+          </a:p>
+          <a:p>
             <a:r>
               <a:rPr lang="en-US" dirty="0">
                 <a:latin typeface="Century Gothic"/>
@@ -6177,13 +6175,13 @@
         </p:spPr>
         <p:txBody>
           <a:bodyPr>
-            <a:normAutofit fontScale="90000"/>
+            <a:normAutofit/>
           </a:bodyPr>
           <a:lstStyle/>
           <a:p>
             <a:r>
               <a:rPr lang="en-US" sz="4400" dirty="0"/>
-              <a:t>Differential Expression Analysis (DE)</a:t>
+              <a:t>Normalization: TMM</a:t>
             </a:r>
           </a:p>
         </p:txBody>
@@ -6216,83 +6214,53 @@
           <a:p>
             <a:r>
               <a:rPr lang="en-US" dirty="0"/>
-              <a:t>HIV Infected Untreated vs. Health Control</a:t>
-            </a:r>
-          </a:p>
-          <a:p>
+              <a:t>More on normalization in RNA-seq data.</a:t>
+            </a:r>
+          </a:p>
+          <a:p>
+            <a:pPr lvl="1"/>
             <a:r>
               <a:rPr lang="en-US" dirty="0"/>
-              <a:t>Significantly differential expressed genes:</a:t>
+              <a:t>It’s crucial to remove sample-specific technical noise by normalization, while keeping biological signals.</a:t>
             </a:r>
           </a:p>
           <a:p>
             <a:pPr lvl="1"/>
             <a:r>
               <a:rPr lang="en-US" dirty="0"/>
-              <a:t>FDR (adjusted p value) cutoff 0.1, 6585 genes out of 19890 are significant.</a:t>
+              <a:t>Total RNA counts per sample vary across samples.</a:t>
             </a:r>
           </a:p>
           <a:p>
             <a:pPr lvl="1"/>
             <a:r>
               <a:rPr lang="en-US" dirty="0"/>
-              <a:t>FDR cutoff 0.05, 4730 genes out of 19890 are significant.</a:t>
+              <a:t>A small number of genes are very highly expressed in some samples, while the levels of most genes don’t change across samples.</a:t>
             </a:r>
           </a:p>
           <a:p>
             <a:r>
               <a:rPr lang="en-US" dirty="0"/>
-              <a:t>Example: </a:t>
-            </a:r>
-          </a:p>
-          <a:p>
+              <a:t>TMM: a trimmed mean of M-values (TMM)</a:t>
+            </a:r>
+          </a:p>
+          <a:p>
+            <a:pPr lvl="1"/>
             <a:r>
               <a:rPr lang="en-US" dirty="0"/>
-              <a:t>EOMES has the smallest adjusted p.</a:t>
-            </a:r>
-          </a:p>
-          <a:p>
-            <a:endParaRPr lang="en-US" dirty="0"/>
-          </a:p>
-          <a:p>
-            <a:endParaRPr lang="en-US" dirty="0"/>
-          </a:p>
-        </p:txBody>
-      </p:sp>
-      <p:pic>
-        <p:nvPicPr>
-          <p:cNvPr id="4" name="Picture 3">
-            <a:extLst>
-              <a:ext uri="{FF2B5EF4-FFF2-40B4-BE49-F238E27FC236}">
-                <a16:creationId xmlns:a16="http://schemas.microsoft.com/office/drawing/2014/main" id="{FA062A07-A556-4608-9617-1801BDCE3DB7}"/>
-              </a:ext>
-            </a:extLst>
-          </p:cNvPr>
-          <p:cNvPicPr>
-            <a:picLocks noChangeAspect="1"/>
-          </p:cNvPicPr>
-          <p:nvPr/>
-        </p:nvPicPr>
-        <p:blipFill>
-          <a:blip r:embed="rId2"/>
-          <a:stretch>
-            <a:fillRect/>
-          </a:stretch>
-        </p:blipFill>
-        <p:spPr>
-          <a:xfrm>
-            <a:off x="4975668" y="3581400"/>
-            <a:ext cx="4731289" cy="2919881"/>
-          </a:xfrm>
-          <a:prstGeom prst="rect">
-            <a:avLst/>
-          </a:prstGeom>
-        </p:spPr>
-      </p:pic>
+              <a:t>Taking above factors into account, by a sample-specific scaling factor and the total RNA counts per sample. </a:t>
+            </a:r>
+          </a:p>
+          <a:p>
+            <a:pPr lvl="1"/>
+            <a:endParaRPr lang="en-US" dirty="0"/>
+          </a:p>
+        </p:txBody>
+      </p:sp>
     </p:spTree>
     <p:extLst>
       <p:ext uri="{BB962C8B-B14F-4D97-AF65-F5344CB8AC3E}">
-        <p14:creationId xmlns:p14="http://schemas.microsoft.com/office/powerpoint/2010/main" val="1441102590"/>
+        <p14:creationId xmlns:p14="http://schemas.microsoft.com/office/powerpoint/2010/main" val="627077646"/>
       </p:ext>
     </p:extLst>
   </p:cSld>
@@ -6338,7 +6306,7 @@
         <p:spPr>
           <a:xfrm>
             <a:off x="677334" y="609600"/>
-            <a:ext cx="8847666" cy="1032769"/>
+            <a:ext cx="8596668" cy="1032769"/>
           </a:xfrm>
         </p:spPr>
         <p:txBody>
@@ -6349,7 +6317,7 @@
           <a:p>
             <a:r>
               <a:rPr lang="en-US" sz="4400" dirty="0"/>
-              <a:t>DE, Top 10 Genes out of 19890 genes</a:t>
+              <a:t>Differential Expression Analysis (DE)</a:t>
             </a:r>
           </a:p>
         </p:txBody>
@@ -6380,6 +6348,44 @@
           <a:bodyPr/>
           <a:lstStyle/>
           <a:p>
+            <a:r>
+              <a:rPr lang="en-US" dirty="0"/>
+              <a:t>HIV Infected Untreated vs. Health Control</a:t>
+            </a:r>
+          </a:p>
+          <a:p>
+            <a:r>
+              <a:rPr lang="en-US" dirty="0"/>
+              <a:t>Significantly differential expressed genes:</a:t>
+            </a:r>
+          </a:p>
+          <a:p>
+            <a:pPr lvl="1"/>
+            <a:r>
+              <a:rPr lang="en-US" dirty="0"/>
+              <a:t>FDR (adjusted p value) cutoff 0.1, 6585 genes out of 19890 are significant.</a:t>
+            </a:r>
+          </a:p>
+          <a:p>
+            <a:pPr lvl="1"/>
+            <a:r>
+              <a:rPr lang="en-US" dirty="0"/>
+              <a:t>FDR cutoff 0.05, 4730 genes out of 19890 are significant.</a:t>
+            </a:r>
+          </a:p>
+          <a:p>
+            <a:r>
+              <a:rPr lang="en-US" dirty="0"/>
+              <a:t>Example: </a:t>
+            </a:r>
+          </a:p>
+          <a:p>
+            <a:r>
+              <a:rPr lang="en-US" dirty="0"/>
+              <a:t>EOMES has the smallest adjusted p.</a:t>
+            </a:r>
+          </a:p>
+          <a:p>
             <a:endParaRPr lang="en-US" dirty="0"/>
           </a:p>
           <a:p>
@@ -6392,7 +6398,7 @@
           <p:cNvPr id="4" name="Picture 3">
             <a:extLst>
               <a:ext uri="{FF2B5EF4-FFF2-40B4-BE49-F238E27FC236}">
-                <a16:creationId xmlns:a16="http://schemas.microsoft.com/office/drawing/2014/main" id="{EE00D617-D55B-486A-A54D-E54AEF78ED8C}"/>
+                <a16:creationId xmlns:a16="http://schemas.microsoft.com/office/drawing/2014/main" id="{FA062A07-A556-4608-9617-1801BDCE3DB7}"/>
               </a:ext>
             </a:extLst>
           </p:cNvPr>
@@ -6409,8 +6415,8 @@
         </p:blipFill>
         <p:spPr>
           <a:xfrm>
-            <a:off x="1944302" y="2324053"/>
-            <a:ext cx="7219950" cy="2962275"/>
+            <a:off x="4975668" y="3581400"/>
+            <a:ext cx="4731289" cy="2919881"/>
           </a:xfrm>
           <a:prstGeom prst="rect">
             <a:avLst/>
@@ -6420,7 +6426,7 @@
     </p:spTree>
     <p:extLst>
       <p:ext uri="{BB962C8B-B14F-4D97-AF65-F5344CB8AC3E}">
-        <p14:creationId xmlns:p14="http://schemas.microsoft.com/office/powerpoint/2010/main" val="2743232787"/>
+        <p14:creationId xmlns:p14="http://schemas.microsoft.com/office/powerpoint/2010/main" val="1441102590"/>
       </p:ext>
     </p:extLst>
   </p:cSld>
@@ -6466,7 +6472,7 @@
         <p:spPr>
           <a:xfrm>
             <a:off x="677334" y="609600"/>
-            <a:ext cx="8596668" cy="1032769"/>
+            <a:ext cx="8847666" cy="1032769"/>
           </a:xfrm>
         </p:spPr>
         <p:txBody>
@@ -6477,7 +6483,7 @@
           <a:p>
             <a:r>
               <a:rPr lang="en-US" sz="4400" dirty="0"/>
-              <a:t>Core ISGs, IFN-beta Genes and DE</a:t>
+              <a:t>DE, Top 10 Genes out of 19890 genes</a:t>
             </a:r>
           </a:p>
         </p:txBody>
@@ -6508,54 +6514,47 @@
           <a:bodyPr/>
           <a:lstStyle/>
           <a:p>
-            <a:r>
-              <a:rPr lang="en-US" sz="2000" dirty="0"/>
-              <a:t>With FDR cutoff 0.1,</a:t>
-            </a:r>
-          </a:p>
-          <a:p>
-            <a:pPr lvl="1"/>
-            <a:r>
-              <a:rPr lang="en-US" sz="1800" dirty="0"/>
-              <a:t>All 230 genes in Core ISGs are significant.</a:t>
-            </a:r>
-          </a:p>
-          <a:p>
-            <a:pPr lvl="1"/>
-            <a:r>
-              <a:rPr lang="en-US" sz="1800" dirty="0"/>
-              <a:t>All 423 genes in IFN-beta genes are significant.</a:t>
-            </a:r>
-          </a:p>
-          <a:p>
-            <a:r>
-              <a:rPr lang="en-US" sz="2000" dirty="0"/>
-              <a:t>With cutoff 0.05</a:t>
-            </a:r>
-          </a:p>
-          <a:p>
-            <a:pPr lvl="1"/>
-            <a:r>
-              <a:rPr lang="en-US" sz="1800" dirty="0"/>
-              <a:t>124 genes in ISGs.</a:t>
-            </a:r>
-          </a:p>
-          <a:p>
-            <a:pPr lvl="1"/>
-            <a:r>
-              <a:rPr lang="en-US" sz="1800" dirty="0"/>
-              <a:t>137 genes in IFN-beta genes.</a:t>
-            </a:r>
-          </a:p>
-          <a:p>
-            <a:endParaRPr lang="en-US" dirty="0"/>
-          </a:p>
-        </p:txBody>
-      </p:sp>
+            <a:endParaRPr lang="en-US" dirty="0"/>
+          </a:p>
+          <a:p>
+            <a:endParaRPr lang="en-US" dirty="0"/>
+          </a:p>
+        </p:txBody>
+      </p:sp>
+      <p:pic>
+        <p:nvPicPr>
+          <p:cNvPr id="4" name="Picture 3">
+            <a:extLst>
+              <a:ext uri="{FF2B5EF4-FFF2-40B4-BE49-F238E27FC236}">
+                <a16:creationId xmlns:a16="http://schemas.microsoft.com/office/drawing/2014/main" id="{EE00D617-D55B-486A-A54D-E54AEF78ED8C}"/>
+              </a:ext>
+            </a:extLst>
+          </p:cNvPr>
+          <p:cNvPicPr>
+            <a:picLocks noChangeAspect="1"/>
+          </p:cNvPicPr>
+          <p:nvPr/>
+        </p:nvPicPr>
+        <p:blipFill>
+          <a:blip r:embed="rId2"/>
+          <a:stretch>
+            <a:fillRect/>
+          </a:stretch>
+        </p:blipFill>
+        <p:spPr>
+          <a:xfrm>
+            <a:off x="1944302" y="2324053"/>
+            <a:ext cx="7219950" cy="2962275"/>
+          </a:xfrm>
+          <a:prstGeom prst="rect">
+            <a:avLst/>
+          </a:prstGeom>
+        </p:spPr>
+      </p:pic>
     </p:spTree>
     <p:extLst>
       <p:ext uri="{BB962C8B-B14F-4D97-AF65-F5344CB8AC3E}">
-        <p14:creationId xmlns:p14="http://schemas.microsoft.com/office/powerpoint/2010/main" val="571863894"/>
+        <p14:creationId xmlns:p14="http://schemas.microsoft.com/office/powerpoint/2010/main" val="2743232787"/>
       </p:ext>
     </p:extLst>
   </p:cSld>
@@ -6606,13 +6605,13 @@
         </p:spPr>
         <p:txBody>
           <a:bodyPr>
-            <a:normAutofit/>
+            <a:normAutofit fontScale="90000"/>
           </a:bodyPr>
           <a:lstStyle/>
           <a:p>
             <a:r>
               <a:rPr lang="en-US" sz="4400" dirty="0"/>
-              <a:t>Top genes in Core ISGs by DE</a:t>
+              <a:t>Core ISGs, IFN-beta Genes and DE</a:t>
             </a:r>
           </a:p>
         </p:txBody>
@@ -6643,77 +6642,54 @@
           <a:bodyPr/>
           <a:lstStyle/>
           <a:p>
-            <a:endParaRPr lang="en-US" dirty="0"/>
-          </a:p>
-          <a:p>
-            <a:endParaRPr lang="en-US" dirty="0"/>
-          </a:p>
-        </p:txBody>
-      </p:sp>
-      <p:pic>
-        <p:nvPicPr>
-          <p:cNvPr id="4" name="Picture 3">
-            <a:extLst>
-              <a:ext uri="{FF2B5EF4-FFF2-40B4-BE49-F238E27FC236}">
-                <a16:creationId xmlns:a16="http://schemas.microsoft.com/office/drawing/2014/main" id="{1F8F9561-2D44-4373-92FD-9B69639233C6}"/>
-              </a:ext>
-            </a:extLst>
-          </p:cNvPr>
-          <p:cNvPicPr>
-            <a:picLocks noChangeAspect="1"/>
-          </p:cNvPicPr>
-          <p:nvPr/>
-        </p:nvPicPr>
-        <p:blipFill>
-          <a:blip r:embed="rId2"/>
-          <a:stretch>
-            <a:fillRect/>
-          </a:stretch>
-        </p:blipFill>
-        <p:spPr>
-          <a:xfrm>
-            <a:off x="1177574" y="1352776"/>
-            <a:ext cx="7596188" cy="2134205"/>
-          </a:xfrm>
-          <a:prstGeom prst="rect">
-            <a:avLst/>
-          </a:prstGeom>
-        </p:spPr>
-      </p:pic>
-      <p:pic>
-        <p:nvPicPr>
-          <p:cNvPr id="5" name="Picture 4">
-            <a:extLst>
-              <a:ext uri="{FF2B5EF4-FFF2-40B4-BE49-F238E27FC236}">
-                <a16:creationId xmlns:a16="http://schemas.microsoft.com/office/drawing/2014/main" id="{05DA80EA-69F2-4E5D-A565-78D5A67E5509}"/>
-              </a:ext>
-            </a:extLst>
-          </p:cNvPr>
-          <p:cNvPicPr>
-            <a:picLocks noChangeAspect="1"/>
-          </p:cNvPicPr>
-          <p:nvPr/>
-        </p:nvPicPr>
-        <p:blipFill>
-          <a:blip r:embed="rId3"/>
-          <a:stretch>
-            <a:fillRect/>
-          </a:stretch>
-        </p:blipFill>
-        <p:spPr>
-          <a:xfrm>
-            <a:off x="3070533" y="3429000"/>
-            <a:ext cx="3810270" cy="3228975"/>
-          </a:xfrm>
-          <a:prstGeom prst="rect">
-            <a:avLst/>
-          </a:prstGeom>
-        </p:spPr>
-      </p:pic>
+            <a:r>
+              <a:rPr lang="en-US" sz="2000" dirty="0"/>
+              <a:t>With FDR cutoff 0.1,</a:t>
+            </a:r>
+          </a:p>
+          <a:p>
+            <a:pPr lvl="1"/>
+            <a:r>
+              <a:rPr lang="en-US" sz="1800" dirty="0"/>
+              <a:t>All 230 genes in Core ISGs are significant.</a:t>
+            </a:r>
+          </a:p>
+          <a:p>
+            <a:pPr lvl="1"/>
+            <a:r>
+              <a:rPr lang="en-US" sz="1800" dirty="0"/>
+              <a:t>All 423 genes in IFN-beta genes are significant.</a:t>
+            </a:r>
+          </a:p>
+          <a:p>
+            <a:r>
+              <a:rPr lang="en-US" sz="2000" dirty="0"/>
+              <a:t>With cutoff 0.05</a:t>
+            </a:r>
+          </a:p>
+          <a:p>
+            <a:pPr lvl="1"/>
+            <a:r>
+              <a:rPr lang="en-US" sz="1800" dirty="0"/>
+              <a:t>124 genes in ISGs.</a:t>
+            </a:r>
+          </a:p>
+          <a:p>
+            <a:pPr lvl="1"/>
+            <a:r>
+              <a:rPr lang="en-US" sz="1800" dirty="0"/>
+              <a:t>137 genes in IFN-beta genes.</a:t>
+            </a:r>
+          </a:p>
+          <a:p>
+            <a:endParaRPr lang="en-US" dirty="0"/>
+          </a:p>
+        </p:txBody>
+      </p:sp>
     </p:spTree>
     <p:extLst>
       <p:ext uri="{BB962C8B-B14F-4D97-AF65-F5344CB8AC3E}">
-        <p14:creationId xmlns:p14="http://schemas.microsoft.com/office/powerpoint/2010/main" val="67145901"/>
+        <p14:creationId xmlns:p14="http://schemas.microsoft.com/office/powerpoint/2010/main" val="571863894"/>
       </p:ext>
     </p:extLst>
   </p:cSld>
@@ -6770,7 +6746,7 @@
           <a:p>
             <a:r>
               <a:rPr lang="en-US" sz="4400" dirty="0"/>
-              <a:t>Top genes in IFN-beta list by DE </a:t>
+              <a:t>Top genes in Core ISGs by DE</a:t>
             </a:r>
           </a:p>
         </p:txBody>
@@ -6813,7 +6789,7 @@
           <p:cNvPr id="4" name="Picture 3">
             <a:extLst>
               <a:ext uri="{FF2B5EF4-FFF2-40B4-BE49-F238E27FC236}">
-                <a16:creationId xmlns:a16="http://schemas.microsoft.com/office/drawing/2014/main" id="{6001FBCF-80F4-4E43-B2AA-D7A3C0BB6407}"/>
+                <a16:creationId xmlns:a16="http://schemas.microsoft.com/office/drawing/2014/main" id="{1F8F9561-2D44-4373-92FD-9B69639233C6}"/>
               </a:ext>
             </a:extLst>
           </p:cNvPr>
@@ -6830,8 +6806,38 @@
         </p:blipFill>
         <p:spPr>
           <a:xfrm>
-            <a:off x="1343025" y="1468884"/>
-            <a:ext cx="6877050" cy="4970681"/>
+            <a:off x="1177574" y="1352776"/>
+            <a:ext cx="7596188" cy="2134205"/>
+          </a:xfrm>
+          <a:prstGeom prst="rect">
+            <a:avLst/>
+          </a:prstGeom>
+        </p:spPr>
+      </p:pic>
+      <p:pic>
+        <p:nvPicPr>
+          <p:cNvPr id="5" name="Picture 4">
+            <a:extLst>
+              <a:ext uri="{FF2B5EF4-FFF2-40B4-BE49-F238E27FC236}">
+                <a16:creationId xmlns:a16="http://schemas.microsoft.com/office/drawing/2014/main" id="{05DA80EA-69F2-4E5D-A565-78D5A67E5509}"/>
+              </a:ext>
+            </a:extLst>
+          </p:cNvPr>
+          <p:cNvPicPr>
+            <a:picLocks noChangeAspect="1"/>
+          </p:cNvPicPr>
+          <p:nvPr/>
+        </p:nvPicPr>
+        <p:blipFill>
+          <a:blip r:embed="rId3"/>
+          <a:stretch>
+            <a:fillRect/>
+          </a:stretch>
+        </p:blipFill>
+        <p:spPr>
+          <a:xfrm>
+            <a:off x="3070533" y="3429000"/>
+            <a:ext cx="3810270" cy="3228975"/>
           </a:xfrm>
           <a:prstGeom prst="rect">
             <a:avLst/>
@@ -6841,7 +6847,7 @@
     </p:spTree>
     <p:extLst>
       <p:ext uri="{BB962C8B-B14F-4D97-AF65-F5344CB8AC3E}">
-        <p14:creationId xmlns:p14="http://schemas.microsoft.com/office/powerpoint/2010/main" val="3587453549"/>
+        <p14:creationId xmlns:p14="http://schemas.microsoft.com/office/powerpoint/2010/main" val="67145901"/>
       </p:ext>
     </p:extLst>
   </p:cSld>
@@ -6886,19 +6892,19 @@
         </p:nvSpPr>
         <p:spPr>
           <a:xfrm>
-            <a:off x="220134" y="164238"/>
+            <a:off x="677334" y="609600"/>
             <a:ext cx="8596668" cy="1032769"/>
           </a:xfrm>
         </p:spPr>
         <p:txBody>
           <a:bodyPr>
-            <a:normAutofit fontScale="90000"/>
+            <a:normAutofit/>
           </a:bodyPr>
           <a:lstStyle/>
           <a:p>
             <a:r>
               <a:rPr lang="en-US" sz="4400" dirty="0"/>
-              <a:t>Volcano Plots by DE and gene lists</a:t>
+              <a:t>Top genes in IFN-beta list by DE </a:t>
             </a:r>
           </a:p>
         </p:txBody>
@@ -6941,7 +6947,7 @@
           <p:cNvPr id="4" name="Picture 3">
             <a:extLst>
               <a:ext uri="{FF2B5EF4-FFF2-40B4-BE49-F238E27FC236}">
-                <a16:creationId xmlns:a16="http://schemas.microsoft.com/office/drawing/2014/main" id="{AC15379C-E862-46B3-937C-D996955B3A0F}"/>
+                <a16:creationId xmlns:a16="http://schemas.microsoft.com/office/drawing/2014/main" id="{6001FBCF-80F4-4E43-B2AA-D7A3C0BB6407}"/>
               </a:ext>
             </a:extLst>
           </p:cNvPr>
@@ -6958,349 +6964,18 @@
         </p:blipFill>
         <p:spPr>
           <a:xfrm>
-            <a:off x="677334" y="1104775"/>
-            <a:ext cx="4550183" cy="2808113"/>
+            <a:off x="1343025" y="1468884"/>
+            <a:ext cx="6877050" cy="4970681"/>
           </a:xfrm>
           <a:prstGeom prst="rect">
             <a:avLst/>
           </a:prstGeom>
         </p:spPr>
       </p:pic>
-      <p:pic>
-        <p:nvPicPr>
-          <p:cNvPr id="5" name="Picture 4">
-            <a:extLst>
-              <a:ext uri="{FF2B5EF4-FFF2-40B4-BE49-F238E27FC236}">
-                <a16:creationId xmlns:a16="http://schemas.microsoft.com/office/drawing/2014/main" id="{DEBDB14D-63DA-426C-8187-97EC9EC2D225}"/>
-              </a:ext>
-            </a:extLst>
-          </p:cNvPr>
-          <p:cNvPicPr>
-            <a:picLocks noChangeAspect="1"/>
-          </p:cNvPicPr>
-          <p:nvPr/>
-        </p:nvPicPr>
-        <p:blipFill>
-          <a:blip r:embed="rId3"/>
-          <a:stretch>
-            <a:fillRect/>
-          </a:stretch>
-        </p:blipFill>
-        <p:spPr>
-          <a:xfrm>
-            <a:off x="5654353" y="1104774"/>
-            <a:ext cx="4550183" cy="2808113"/>
-          </a:xfrm>
-          <a:prstGeom prst="rect">
-            <a:avLst/>
-          </a:prstGeom>
-        </p:spPr>
-      </p:pic>
-      <p:pic>
-        <p:nvPicPr>
-          <p:cNvPr id="6" name="Picture 5">
-            <a:extLst>
-              <a:ext uri="{FF2B5EF4-FFF2-40B4-BE49-F238E27FC236}">
-                <a16:creationId xmlns:a16="http://schemas.microsoft.com/office/drawing/2014/main" id="{7239D7C8-5E7C-4E72-8D11-72EF14C01081}"/>
-              </a:ext>
-            </a:extLst>
-          </p:cNvPr>
-          <p:cNvPicPr>
-            <a:picLocks noChangeAspect="1"/>
-          </p:cNvPicPr>
-          <p:nvPr/>
-        </p:nvPicPr>
-        <p:blipFill>
-          <a:blip r:embed="rId4"/>
-          <a:stretch>
-            <a:fillRect/>
-          </a:stretch>
-        </p:blipFill>
-        <p:spPr>
-          <a:xfrm>
-            <a:off x="5654352" y="3912889"/>
-            <a:ext cx="4550183" cy="2808113"/>
-          </a:xfrm>
-          <a:prstGeom prst="rect">
-            <a:avLst/>
-          </a:prstGeom>
-        </p:spPr>
-      </p:pic>
-      <p:sp>
-        <p:nvSpPr>
-          <p:cNvPr id="7" name="Content Placeholder 2">
-            <a:extLst>
-              <a:ext uri="{FF2B5EF4-FFF2-40B4-BE49-F238E27FC236}">
-                <a16:creationId xmlns:a16="http://schemas.microsoft.com/office/drawing/2014/main" id="{EDCB6E52-BE8A-4C49-960D-2B840321C40C}"/>
-              </a:ext>
-            </a:extLst>
-          </p:cNvPr>
-          <p:cNvSpPr txBox="1">
-            <a:spLocks/>
-          </p:cNvSpPr>
-          <p:nvPr/>
-        </p:nvSpPr>
-        <p:spPr>
-          <a:xfrm>
-            <a:off x="829734" y="4181383"/>
-            <a:ext cx="4550183" cy="2012380"/>
-          </a:xfrm>
-          <a:prstGeom prst="rect">
-            <a:avLst/>
-          </a:prstGeom>
-        </p:spPr>
-        <p:txBody>
-          <a:bodyPr vert="horz" lIns="91440" tIns="45720" rIns="91440" bIns="45720" rtlCol="0">
-            <a:normAutofit/>
-          </a:bodyPr>
-          <a:lstStyle>
-            <a:lvl1pPr marL="342900" indent="-342900" algn="l" defTabSz="457200" rtl="0" eaLnBrk="1" latinLnBrk="0" hangingPunct="1">
-              <a:spcBef>
-                <a:spcPts val="1000"/>
-              </a:spcBef>
-              <a:spcAft>
-                <a:spcPts val="0"/>
-              </a:spcAft>
-              <a:buClr>
-                <a:schemeClr val="accent1"/>
-              </a:buClr>
-              <a:buSzPct val="80000"/>
-              <a:buFont typeface="Wingdings 3" charset="2"/>
-              <a:buChar char=""/>
-              <a:defRPr sz="1800" kern="1200">
-                <a:solidFill>
-                  <a:schemeClr val="tx1">
-                    <a:lumMod val="75000"/>
-                    <a:lumOff val="25000"/>
-                  </a:schemeClr>
-                </a:solidFill>
-                <a:latin typeface="+mn-lt"/>
-                <a:ea typeface="+mn-ea"/>
-                <a:cs typeface="+mn-cs"/>
-              </a:defRPr>
-            </a:lvl1pPr>
-            <a:lvl2pPr marL="742950" indent="-285750" algn="l" defTabSz="457200" rtl="0" eaLnBrk="1" latinLnBrk="0" hangingPunct="1">
-              <a:spcBef>
-                <a:spcPts val="1000"/>
-              </a:spcBef>
-              <a:spcAft>
-                <a:spcPts val="0"/>
-              </a:spcAft>
-              <a:buClr>
-                <a:schemeClr val="accent1"/>
-              </a:buClr>
-              <a:buSzPct val="80000"/>
-              <a:buFont typeface="Wingdings 3" charset="2"/>
-              <a:buChar char=""/>
-              <a:defRPr sz="1600" kern="1200">
-                <a:solidFill>
-                  <a:schemeClr val="tx1">
-                    <a:lumMod val="75000"/>
-                    <a:lumOff val="25000"/>
-                  </a:schemeClr>
-                </a:solidFill>
-                <a:latin typeface="+mn-lt"/>
-                <a:ea typeface="+mn-ea"/>
-                <a:cs typeface="+mn-cs"/>
-              </a:defRPr>
-            </a:lvl2pPr>
-            <a:lvl3pPr marL="1143000" indent="-228600" algn="l" defTabSz="457200" rtl="0" eaLnBrk="1" latinLnBrk="0" hangingPunct="1">
-              <a:spcBef>
-                <a:spcPts val="1000"/>
-              </a:spcBef>
-              <a:spcAft>
-                <a:spcPts val="0"/>
-              </a:spcAft>
-              <a:buClr>
-                <a:schemeClr val="accent1"/>
-              </a:buClr>
-              <a:buSzPct val="80000"/>
-              <a:buFont typeface="Wingdings 3" charset="2"/>
-              <a:buChar char=""/>
-              <a:defRPr sz="1400" kern="1200">
-                <a:solidFill>
-                  <a:schemeClr val="tx1">
-                    <a:lumMod val="75000"/>
-                    <a:lumOff val="25000"/>
-                  </a:schemeClr>
-                </a:solidFill>
-                <a:latin typeface="+mn-lt"/>
-                <a:ea typeface="+mn-ea"/>
-                <a:cs typeface="+mn-cs"/>
-              </a:defRPr>
-            </a:lvl3pPr>
-            <a:lvl4pPr marL="1600200" indent="-228600" algn="l" defTabSz="457200" rtl="0" eaLnBrk="1" latinLnBrk="0" hangingPunct="1">
-              <a:spcBef>
-                <a:spcPts val="1000"/>
-              </a:spcBef>
-              <a:spcAft>
-                <a:spcPts val="0"/>
-              </a:spcAft>
-              <a:buClr>
-                <a:schemeClr val="accent1"/>
-              </a:buClr>
-              <a:buSzPct val="80000"/>
-              <a:buFont typeface="Wingdings 3" charset="2"/>
-              <a:buChar char=""/>
-              <a:defRPr sz="1200" kern="1200">
-                <a:solidFill>
-                  <a:schemeClr val="tx1">
-                    <a:lumMod val="75000"/>
-                    <a:lumOff val="25000"/>
-                  </a:schemeClr>
-                </a:solidFill>
-                <a:latin typeface="+mn-lt"/>
-                <a:ea typeface="+mn-ea"/>
-                <a:cs typeface="+mn-cs"/>
-              </a:defRPr>
-            </a:lvl4pPr>
-            <a:lvl5pPr marL="2057400" indent="-228600" algn="l" defTabSz="457200" rtl="0" eaLnBrk="1" latinLnBrk="0" hangingPunct="1">
-              <a:spcBef>
-                <a:spcPts val="1000"/>
-              </a:spcBef>
-              <a:spcAft>
-                <a:spcPts val="0"/>
-              </a:spcAft>
-              <a:buClr>
-                <a:schemeClr val="accent1"/>
-              </a:buClr>
-              <a:buSzPct val="80000"/>
-              <a:buFont typeface="Wingdings 3" charset="2"/>
-              <a:buChar char=""/>
-              <a:defRPr sz="1200" kern="1200">
-                <a:solidFill>
-                  <a:schemeClr val="tx1">
-                    <a:lumMod val="75000"/>
-                    <a:lumOff val="25000"/>
-                  </a:schemeClr>
-                </a:solidFill>
-                <a:latin typeface="+mn-lt"/>
-                <a:ea typeface="+mn-ea"/>
-                <a:cs typeface="+mn-cs"/>
-              </a:defRPr>
-            </a:lvl5pPr>
-            <a:lvl6pPr marL="2514600" indent="-228600" algn="l" defTabSz="457200" rtl="0" eaLnBrk="1" latinLnBrk="0" hangingPunct="1">
-              <a:spcBef>
-                <a:spcPts val="1000"/>
-              </a:spcBef>
-              <a:spcAft>
-                <a:spcPts val="0"/>
-              </a:spcAft>
-              <a:buClr>
-                <a:schemeClr val="accent1"/>
-              </a:buClr>
-              <a:buSzPct val="80000"/>
-              <a:buFont typeface="Wingdings 3" charset="2"/>
-              <a:buChar char=""/>
-              <a:defRPr sz="1200" kern="1200">
-                <a:solidFill>
-                  <a:schemeClr val="tx1">
-                    <a:lumMod val="75000"/>
-                    <a:lumOff val="25000"/>
-                  </a:schemeClr>
-                </a:solidFill>
-                <a:latin typeface="+mn-lt"/>
-                <a:ea typeface="+mn-ea"/>
-                <a:cs typeface="+mn-cs"/>
-              </a:defRPr>
-            </a:lvl6pPr>
-            <a:lvl7pPr marL="2971800" indent="-228600" algn="l" defTabSz="457200" rtl="0" eaLnBrk="1" latinLnBrk="0" hangingPunct="1">
-              <a:spcBef>
-                <a:spcPts val="1000"/>
-              </a:spcBef>
-              <a:spcAft>
-                <a:spcPts val="0"/>
-              </a:spcAft>
-              <a:buClr>
-                <a:schemeClr val="accent1"/>
-              </a:buClr>
-              <a:buSzPct val="80000"/>
-              <a:buFont typeface="Wingdings 3" charset="2"/>
-              <a:buChar char=""/>
-              <a:defRPr sz="1200" kern="1200">
-                <a:solidFill>
-                  <a:schemeClr val="tx1">
-                    <a:lumMod val="75000"/>
-                    <a:lumOff val="25000"/>
-                  </a:schemeClr>
-                </a:solidFill>
-                <a:latin typeface="+mn-lt"/>
-                <a:ea typeface="+mn-ea"/>
-                <a:cs typeface="+mn-cs"/>
-              </a:defRPr>
-            </a:lvl7pPr>
-            <a:lvl8pPr marL="3429000" indent="-228600" algn="l" defTabSz="457200" rtl="0" eaLnBrk="1" latinLnBrk="0" hangingPunct="1">
-              <a:spcBef>
-                <a:spcPts val="1000"/>
-              </a:spcBef>
-              <a:spcAft>
-                <a:spcPts val="0"/>
-              </a:spcAft>
-              <a:buClr>
-                <a:schemeClr val="accent1"/>
-              </a:buClr>
-              <a:buSzPct val="80000"/>
-              <a:buFont typeface="Wingdings 3" charset="2"/>
-              <a:buChar char=""/>
-              <a:defRPr sz="1200" kern="1200">
-                <a:solidFill>
-                  <a:schemeClr val="tx1">
-                    <a:lumMod val="75000"/>
-                    <a:lumOff val="25000"/>
-                  </a:schemeClr>
-                </a:solidFill>
-                <a:latin typeface="+mn-lt"/>
-                <a:ea typeface="+mn-ea"/>
-                <a:cs typeface="+mn-cs"/>
-              </a:defRPr>
-            </a:lvl8pPr>
-            <a:lvl9pPr marL="3886200" indent="-228600" algn="l" defTabSz="457200" rtl="0" eaLnBrk="1" latinLnBrk="0" hangingPunct="1">
-              <a:spcBef>
-                <a:spcPts val="1000"/>
-              </a:spcBef>
-              <a:spcAft>
-                <a:spcPts val="0"/>
-              </a:spcAft>
-              <a:buClr>
-                <a:schemeClr val="accent1"/>
-              </a:buClr>
-              <a:buSzPct val="80000"/>
-              <a:buFont typeface="Wingdings 3" charset="2"/>
-              <a:buChar char=""/>
-              <a:defRPr sz="1200" kern="1200">
-                <a:solidFill>
-                  <a:schemeClr val="tx1">
-                    <a:lumMod val="75000"/>
-                    <a:lumOff val="25000"/>
-                  </a:schemeClr>
-                </a:solidFill>
-                <a:latin typeface="+mn-lt"/>
-                <a:ea typeface="+mn-ea"/>
-                <a:cs typeface="+mn-cs"/>
-              </a:defRPr>
-            </a:lvl9pPr>
-          </a:lstStyle>
-          <a:p>
-            <a:r>
-              <a:rPr lang="en-US" dirty="0"/>
-              <a:t>From here, I just used all Core ISGs list and IFN-beta genes for downstream analysis, since all genes are FDR &lt;= 0.1</a:t>
-            </a:r>
-          </a:p>
-          <a:p>
-            <a:r>
-              <a:rPr lang="en-US" dirty="0"/>
-              <a:t>Results are also available for subsets of gene lists by FDR 0.05. </a:t>
-            </a:r>
-          </a:p>
-          <a:p>
-            <a:endParaRPr lang="en-US" dirty="0"/>
-          </a:p>
-        </p:txBody>
-      </p:sp>
     </p:spTree>
     <p:extLst>
       <p:ext uri="{BB962C8B-B14F-4D97-AF65-F5344CB8AC3E}">
-        <p14:creationId xmlns:p14="http://schemas.microsoft.com/office/powerpoint/2010/main" val="1863836157"/>
+        <p14:creationId xmlns:p14="http://schemas.microsoft.com/office/powerpoint/2010/main" val="3587453549"/>
       </p:ext>
     </p:extLst>
   </p:cSld>
@@ -7345,8 +7020,8 @@
         </p:nvSpPr>
         <p:spPr>
           <a:xfrm>
-            <a:off x="677334" y="609600"/>
-            <a:ext cx="9265656" cy="1032769"/>
+            <a:off x="220134" y="164238"/>
+            <a:ext cx="8596668" cy="1032769"/>
           </a:xfrm>
         </p:spPr>
         <p:txBody>
@@ -7357,7 +7032,7 @@
           <a:p>
             <a:r>
               <a:rPr lang="en-US" sz="4400" dirty="0"/>
-              <a:t>Core ISGs, IFN-beta Genes and DE: clustering </a:t>
+              <a:t>Volcano Plots by DE and gene lists</a:t>
             </a:r>
           </a:p>
         </p:txBody>
@@ -7400,7 +7075,7 @@
           <p:cNvPr id="4" name="Picture 3">
             <a:extLst>
               <a:ext uri="{FF2B5EF4-FFF2-40B4-BE49-F238E27FC236}">
-                <a16:creationId xmlns:a16="http://schemas.microsoft.com/office/drawing/2014/main" id="{A7CE698E-B39A-4F5B-BFC4-B954F3890269}"/>
+                <a16:creationId xmlns:a16="http://schemas.microsoft.com/office/drawing/2014/main" id="{AC15379C-E862-46B3-937C-D996955B3A0F}"/>
               </a:ext>
             </a:extLst>
           </p:cNvPr>
@@ -7417,8 +7092,8 @@
         </p:blipFill>
         <p:spPr>
           <a:xfrm>
-            <a:off x="677334" y="2363963"/>
-            <a:ext cx="4772256" cy="2945164"/>
+            <a:off x="677334" y="1104775"/>
+            <a:ext cx="4550183" cy="2808113"/>
           </a:xfrm>
           <a:prstGeom prst="rect">
             <a:avLst/>
@@ -7430,7 +7105,7 @@
           <p:cNvPr id="5" name="Picture 4">
             <a:extLst>
               <a:ext uri="{FF2B5EF4-FFF2-40B4-BE49-F238E27FC236}">
-                <a16:creationId xmlns:a16="http://schemas.microsoft.com/office/drawing/2014/main" id="{6B2D850A-F447-40CA-9B8F-A7AFEA9C14AC}"/>
+                <a16:creationId xmlns:a16="http://schemas.microsoft.com/office/drawing/2014/main" id="{DEBDB14D-63DA-426C-8187-97EC9EC2D225}"/>
               </a:ext>
             </a:extLst>
           </p:cNvPr>
@@ -7447,18 +7122,319 @@
         </p:blipFill>
         <p:spPr>
           <a:xfrm>
-            <a:off x="5851746" y="2363963"/>
-            <a:ext cx="4772256" cy="2945164"/>
+            <a:off x="5654353" y="1104774"/>
+            <a:ext cx="4550183" cy="2808113"/>
           </a:xfrm>
           <a:prstGeom prst="rect">
             <a:avLst/>
           </a:prstGeom>
         </p:spPr>
       </p:pic>
+      <p:pic>
+        <p:nvPicPr>
+          <p:cNvPr id="6" name="Picture 5">
+            <a:extLst>
+              <a:ext uri="{FF2B5EF4-FFF2-40B4-BE49-F238E27FC236}">
+                <a16:creationId xmlns:a16="http://schemas.microsoft.com/office/drawing/2014/main" id="{7239D7C8-5E7C-4E72-8D11-72EF14C01081}"/>
+              </a:ext>
+            </a:extLst>
+          </p:cNvPr>
+          <p:cNvPicPr>
+            <a:picLocks noChangeAspect="1"/>
+          </p:cNvPicPr>
+          <p:nvPr/>
+        </p:nvPicPr>
+        <p:blipFill>
+          <a:blip r:embed="rId4"/>
+          <a:stretch>
+            <a:fillRect/>
+          </a:stretch>
+        </p:blipFill>
+        <p:spPr>
+          <a:xfrm>
+            <a:off x="5654352" y="3912889"/>
+            <a:ext cx="4550183" cy="2808113"/>
+          </a:xfrm>
+          <a:prstGeom prst="rect">
+            <a:avLst/>
+          </a:prstGeom>
+        </p:spPr>
+      </p:pic>
+      <p:sp>
+        <p:nvSpPr>
+          <p:cNvPr id="7" name="Content Placeholder 2">
+            <a:extLst>
+              <a:ext uri="{FF2B5EF4-FFF2-40B4-BE49-F238E27FC236}">
+                <a16:creationId xmlns:a16="http://schemas.microsoft.com/office/drawing/2014/main" id="{EDCB6E52-BE8A-4C49-960D-2B840321C40C}"/>
+              </a:ext>
+            </a:extLst>
+          </p:cNvPr>
+          <p:cNvSpPr txBox="1">
+            <a:spLocks/>
+          </p:cNvSpPr>
+          <p:nvPr/>
+        </p:nvSpPr>
+        <p:spPr>
+          <a:xfrm>
+            <a:off x="829734" y="4181383"/>
+            <a:ext cx="4550183" cy="2012380"/>
+          </a:xfrm>
+          <a:prstGeom prst="rect">
+            <a:avLst/>
+          </a:prstGeom>
+        </p:spPr>
+        <p:txBody>
+          <a:bodyPr vert="horz" lIns="91440" tIns="45720" rIns="91440" bIns="45720" rtlCol="0">
+            <a:normAutofit/>
+          </a:bodyPr>
+          <a:lstStyle>
+            <a:lvl1pPr marL="342900" indent="-342900" algn="l" defTabSz="457200" rtl="0" eaLnBrk="1" latinLnBrk="0" hangingPunct="1">
+              <a:spcBef>
+                <a:spcPts val="1000"/>
+              </a:spcBef>
+              <a:spcAft>
+                <a:spcPts val="0"/>
+              </a:spcAft>
+              <a:buClr>
+                <a:schemeClr val="accent1"/>
+              </a:buClr>
+              <a:buSzPct val="80000"/>
+              <a:buFont typeface="Wingdings 3" charset="2"/>
+              <a:buChar char=""/>
+              <a:defRPr sz="1800" kern="1200">
+                <a:solidFill>
+                  <a:schemeClr val="tx1">
+                    <a:lumMod val="75000"/>
+                    <a:lumOff val="25000"/>
+                  </a:schemeClr>
+                </a:solidFill>
+                <a:latin typeface="+mn-lt"/>
+                <a:ea typeface="+mn-ea"/>
+                <a:cs typeface="+mn-cs"/>
+              </a:defRPr>
+            </a:lvl1pPr>
+            <a:lvl2pPr marL="742950" indent="-285750" algn="l" defTabSz="457200" rtl="0" eaLnBrk="1" latinLnBrk="0" hangingPunct="1">
+              <a:spcBef>
+                <a:spcPts val="1000"/>
+              </a:spcBef>
+              <a:spcAft>
+                <a:spcPts val="0"/>
+              </a:spcAft>
+              <a:buClr>
+                <a:schemeClr val="accent1"/>
+              </a:buClr>
+              <a:buSzPct val="80000"/>
+              <a:buFont typeface="Wingdings 3" charset="2"/>
+              <a:buChar char=""/>
+              <a:defRPr sz="1600" kern="1200">
+                <a:solidFill>
+                  <a:schemeClr val="tx1">
+                    <a:lumMod val="75000"/>
+                    <a:lumOff val="25000"/>
+                  </a:schemeClr>
+                </a:solidFill>
+                <a:latin typeface="+mn-lt"/>
+                <a:ea typeface="+mn-ea"/>
+                <a:cs typeface="+mn-cs"/>
+              </a:defRPr>
+            </a:lvl2pPr>
+            <a:lvl3pPr marL="1143000" indent="-228600" algn="l" defTabSz="457200" rtl="0" eaLnBrk="1" latinLnBrk="0" hangingPunct="1">
+              <a:spcBef>
+                <a:spcPts val="1000"/>
+              </a:spcBef>
+              <a:spcAft>
+                <a:spcPts val="0"/>
+              </a:spcAft>
+              <a:buClr>
+                <a:schemeClr val="accent1"/>
+              </a:buClr>
+              <a:buSzPct val="80000"/>
+              <a:buFont typeface="Wingdings 3" charset="2"/>
+              <a:buChar char=""/>
+              <a:defRPr sz="1400" kern="1200">
+                <a:solidFill>
+                  <a:schemeClr val="tx1">
+                    <a:lumMod val="75000"/>
+                    <a:lumOff val="25000"/>
+                  </a:schemeClr>
+                </a:solidFill>
+                <a:latin typeface="+mn-lt"/>
+                <a:ea typeface="+mn-ea"/>
+                <a:cs typeface="+mn-cs"/>
+              </a:defRPr>
+            </a:lvl3pPr>
+            <a:lvl4pPr marL="1600200" indent="-228600" algn="l" defTabSz="457200" rtl="0" eaLnBrk="1" latinLnBrk="0" hangingPunct="1">
+              <a:spcBef>
+                <a:spcPts val="1000"/>
+              </a:spcBef>
+              <a:spcAft>
+                <a:spcPts val="0"/>
+              </a:spcAft>
+              <a:buClr>
+                <a:schemeClr val="accent1"/>
+              </a:buClr>
+              <a:buSzPct val="80000"/>
+              <a:buFont typeface="Wingdings 3" charset="2"/>
+              <a:buChar char=""/>
+              <a:defRPr sz="1200" kern="1200">
+                <a:solidFill>
+                  <a:schemeClr val="tx1">
+                    <a:lumMod val="75000"/>
+                    <a:lumOff val="25000"/>
+                  </a:schemeClr>
+                </a:solidFill>
+                <a:latin typeface="+mn-lt"/>
+                <a:ea typeface="+mn-ea"/>
+                <a:cs typeface="+mn-cs"/>
+              </a:defRPr>
+            </a:lvl4pPr>
+            <a:lvl5pPr marL="2057400" indent="-228600" algn="l" defTabSz="457200" rtl="0" eaLnBrk="1" latinLnBrk="0" hangingPunct="1">
+              <a:spcBef>
+                <a:spcPts val="1000"/>
+              </a:spcBef>
+              <a:spcAft>
+                <a:spcPts val="0"/>
+              </a:spcAft>
+              <a:buClr>
+                <a:schemeClr val="accent1"/>
+              </a:buClr>
+              <a:buSzPct val="80000"/>
+              <a:buFont typeface="Wingdings 3" charset="2"/>
+              <a:buChar char=""/>
+              <a:defRPr sz="1200" kern="1200">
+                <a:solidFill>
+                  <a:schemeClr val="tx1">
+                    <a:lumMod val="75000"/>
+                    <a:lumOff val="25000"/>
+                  </a:schemeClr>
+                </a:solidFill>
+                <a:latin typeface="+mn-lt"/>
+                <a:ea typeface="+mn-ea"/>
+                <a:cs typeface="+mn-cs"/>
+              </a:defRPr>
+            </a:lvl5pPr>
+            <a:lvl6pPr marL="2514600" indent="-228600" algn="l" defTabSz="457200" rtl="0" eaLnBrk="1" latinLnBrk="0" hangingPunct="1">
+              <a:spcBef>
+                <a:spcPts val="1000"/>
+              </a:spcBef>
+              <a:spcAft>
+                <a:spcPts val="0"/>
+              </a:spcAft>
+              <a:buClr>
+                <a:schemeClr val="accent1"/>
+              </a:buClr>
+              <a:buSzPct val="80000"/>
+              <a:buFont typeface="Wingdings 3" charset="2"/>
+              <a:buChar char=""/>
+              <a:defRPr sz="1200" kern="1200">
+                <a:solidFill>
+                  <a:schemeClr val="tx1">
+                    <a:lumMod val="75000"/>
+                    <a:lumOff val="25000"/>
+                  </a:schemeClr>
+                </a:solidFill>
+                <a:latin typeface="+mn-lt"/>
+                <a:ea typeface="+mn-ea"/>
+                <a:cs typeface="+mn-cs"/>
+              </a:defRPr>
+            </a:lvl6pPr>
+            <a:lvl7pPr marL="2971800" indent="-228600" algn="l" defTabSz="457200" rtl="0" eaLnBrk="1" latinLnBrk="0" hangingPunct="1">
+              <a:spcBef>
+                <a:spcPts val="1000"/>
+              </a:spcBef>
+              <a:spcAft>
+                <a:spcPts val="0"/>
+              </a:spcAft>
+              <a:buClr>
+                <a:schemeClr val="accent1"/>
+              </a:buClr>
+              <a:buSzPct val="80000"/>
+              <a:buFont typeface="Wingdings 3" charset="2"/>
+              <a:buChar char=""/>
+              <a:defRPr sz="1200" kern="1200">
+                <a:solidFill>
+                  <a:schemeClr val="tx1">
+                    <a:lumMod val="75000"/>
+                    <a:lumOff val="25000"/>
+                  </a:schemeClr>
+                </a:solidFill>
+                <a:latin typeface="+mn-lt"/>
+                <a:ea typeface="+mn-ea"/>
+                <a:cs typeface="+mn-cs"/>
+              </a:defRPr>
+            </a:lvl7pPr>
+            <a:lvl8pPr marL="3429000" indent="-228600" algn="l" defTabSz="457200" rtl="0" eaLnBrk="1" latinLnBrk="0" hangingPunct="1">
+              <a:spcBef>
+                <a:spcPts val="1000"/>
+              </a:spcBef>
+              <a:spcAft>
+                <a:spcPts val="0"/>
+              </a:spcAft>
+              <a:buClr>
+                <a:schemeClr val="accent1"/>
+              </a:buClr>
+              <a:buSzPct val="80000"/>
+              <a:buFont typeface="Wingdings 3" charset="2"/>
+              <a:buChar char=""/>
+              <a:defRPr sz="1200" kern="1200">
+                <a:solidFill>
+                  <a:schemeClr val="tx1">
+                    <a:lumMod val="75000"/>
+                    <a:lumOff val="25000"/>
+                  </a:schemeClr>
+                </a:solidFill>
+                <a:latin typeface="+mn-lt"/>
+                <a:ea typeface="+mn-ea"/>
+                <a:cs typeface="+mn-cs"/>
+              </a:defRPr>
+            </a:lvl8pPr>
+            <a:lvl9pPr marL="3886200" indent="-228600" algn="l" defTabSz="457200" rtl="0" eaLnBrk="1" latinLnBrk="0" hangingPunct="1">
+              <a:spcBef>
+                <a:spcPts val="1000"/>
+              </a:spcBef>
+              <a:spcAft>
+                <a:spcPts val="0"/>
+              </a:spcAft>
+              <a:buClr>
+                <a:schemeClr val="accent1"/>
+              </a:buClr>
+              <a:buSzPct val="80000"/>
+              <a:buFont typeface="Wingdings 3" charset="2"/>
+              <a:buChar char=""/>
+              <a:defRPr sz="1200" kern="1200">
+                <a:solidFill>
+                  <a:schemeClr val="tx1">
+                    <a:lumMod val="75000"/>
+                    <a:lumOff val="25000"/>
+                  </a:schemeClr>
+                </a:solidFill>
+                <a:latin typeface="+mn-lt"/>
+                <a:ea typeface="+mn-ea"/>
+                <a:cs typeface="+mn-cs"/>
+              </a:defRPr>
+            </a:lvl9pPr>
+          </a:lstStyle>
+          <a:p>
+            <a:r>
+              <a:rPr lang="en-US" dirty="0"/>
+              <a:t>From here, I just used all Core ISGs list and IFN-beta genes for downstream analysis, since all genes are FDR &lt;= 0.1</a:t>
+            </a:r>
+          </a:p>
+          <a:p>
+            <a:r>
+              <a:rPr lang="en-US" dirty="0"/>
+              <a:t>Results are also available for subsets of gene lists by FDR 0.05. </a:t>
+            </a:r>
+          </a:p>
+          <a:p>
+            <a:endParaRPr lang="en-US" dirty="0"/>
+          </a:p>
+        </p:txBody>
+      </p:sp>
     </p:spTree>
     <p:extLst>
       <p:ext uri="{BB962C8B-B14F-4D97-AF65-F5344CB8AC3E}">
-        <p14:creationId xmlns:p14="http://schemas.microsoft.com/office/powerpoint/2010/main" val="2409549716"/>
+        <p14:creationId xmlns:p14="http://schemas.microsoft.com/office/powerpoint/2010/main" val="1863836157"/>
       </p:ext>
     </p:extLst>
   </p:cSld>
@@ -7503,8 +7479,8 @@
         </p:nvSpPr>
         <p:spPr>
           <a:xfrm>
-            <a:off x="277283" y="318619"/>
-            <a:ext cx="9590617" cy="1032769"/>
+            <a:off x="677334" y="609600"/>
+            <a:ext cx="9265656" cy="1032769"/>
           </a:xfrm>
         </p:spPr>
         <p:txBody>
@@ -7515,7 +7491,7 @@
           <a:p>
             <a:r>
               <a:rPr lang="en-US" sz="4400" dirty="0"/>
-              <a:t>Core ISGs, IFN-beta Genes and Viral Load </a:t>
+              <a:t>Core ISGs, IFN-beta Genes and DE: clustering </a:t>
             </a:r>
           </a:p>
         </p:txBody>
@@ -7558,7 +7534,7 @@
           <p:cNvPr id="4" name="Picture 3">
             <a:extLst>
               <a:ext uri="{FF2B5EF4-FFF2-40B4-BE49-F238E27FC236}">
-                <a16:creationId xmlns:a16="http://schemas.microsoft.com/office/drawing/2014/main" id="{5E14F700-5C15-412A-BF30-578DB4EAE9F4}"/>
+                <a16:creationId xmlns:a16="http://schemas.microsoft.com/office/drawing/2014/main" id="{A7CE698E-B39A-4F5B-BFC4-B954F3890269}"/>
               </a:ext>
             </a:extLst>
           </p:cNvPr>
@@ -7575,8 +7551,8 @@
         </p:blipFill>
         <p:spPr>
           <a:xfrm>
-            <a:off x="439209" y="1455438"/>
-            <a:ext cx="5286555" cy="2973687"/>
+            <a:off x="677334" y="2363963"/>
+            <a:ext cx="4772256" cy="2945164"/>
           </a:xfrm>
           <a:prstGeom prst="rect">
             <a:avLst/>
@@ -7588,7 +7564,7 @@
           <p:cNvPr id="5" name="Picture 4">
             <a:extLst>
               <a:ext uri="{FF2B5EF4-FFF2-40B4-BE49-F238E27FC236}">
-                <a16:creationId xmlns:a16="http://schemas.microsoft.com/office/drawing/2014/main" id="{B9511C8E-AEC3-4340-B677-4F87EE008B14}"/>
+                <a16:creationId xmlns:a16="http://schemas.microsoft.com/office/drawing/2014/main" id="{6B2D850A-F447-40CA-9B8F-A7AFEA9C14AC}"/>
               </a:ext>
             </a:extLst>
           </p:cNvPr>
@@ -7605,294 +7581,18 @@
         </p:blipFill>
         <p:spPr>
           <a:xfrm>
-            <a:off x="6077413" y="1351388"/>
-            <a:ext cx="5419205" cy="3077737"/>
+            <a:off x="5851746" y="2363963"/>
+            <a:ext cx="4772256" cy="2945164"/>
           </a:xfrm>
           <a:prstGeom prst="rect">
             <a:avLst/>
           </a:prstGeom>
         </p:spPr>
       </p:pic>
-      <p:sp>
-        <p:nvSpPr>
-          <p:cNvPr id="6" name="Content Placeholder 2">
-            <a:extLst>
-              <a:ext uri="{FF2B5EF4-FFF2-40B4-BE49-F238E27FC236}">
-                <a16:creationId xmlns:a16="http://schemas.microsoft.com/office/drawing/2014/main" id="{7067C4C8-74CB-41C7-A8FB-91680BDFB405}"/>
-              </a:ext>
-            </a:extLst>
-          </p:cNvPr>
-          <p:cNvSpPr txBox="1">
-            <a:spLocks/>
-          </p:cNvSpPr>
-          <p:nvPr/>
-        </p:nvSpPr>
-        <p:spPr>
-          <a:xfrm>
-            <a:off x="915459" y="4676318"/>
-            <a:ext cx="8596668" cy="1660588"/>
-          </a:xfrm>
-          <a:prstGeom prst="rect">
-            <a:avLst/>
-          </a:prstGeom>
-        </p:spPr>
-        <p:txBody>
-          <a:bodyPr vert="horz" lIns="91440" tIns="45720" rIns="91440" bIns="45720" rtlCol="0">
-            <a:normAutofit/>
-          </a:bodyPr>
-          <a:lstStyle>
-            <a:lvl1pPr marL="342900" indent="-342900" algn="l" defTabSz="457200" rtl="0" eaLnBrk="1" latinLnBrk="0" hangingPunct="1">
-              <a:spcBef>
-                <a:spcPts val="1000"/>
-              </a:spcBef>
-              <a:spcAft>
-                <a:spcPts val="0"/>
-              </a:spcAft>
-              <a:buClr>
-                <a:schemeClr val="accent1"/>
-              </a:buClr>
-              <a:buSzPct val="80000"/>
-              <a:buFont typeface="Wingdings 3" charset="2"/>
-              <a:buChar char=""/>
-              <a:defRPr sz="1800" kern="1200">
-                <a:solidFill>
-                  <a:schemeClr val="tx1">
-                    <a:lumMod val="75000"/>
-                    <a:lumOff val="25000"/>
-                  </a:schemeClr>
-                </a:solidFill>
-                <a:latin typeface="+mn-lt"/>
-                <a:ea typeface="+mn-ea"/>
-                <a:cs typeface="+mn-cs"/>
-              </a:defRPr>
-            </a:lvl1pPr>
-            <a:lvl2pPr marL="742950" indent="-285750" algn="l" defTabSz="457200" rtl="0" eaLnBrk="1" latinLnBrk="0" hangingPunct="1">
-              <a:spcBef>
-                <a:spcPts val="1000"/>
-              </a:spcBef>
-              <a:spcAft>
-                <a:spcPts val="0"/>
-              </a:spcAft>
-              <a:buClr>
-                <a:schemeClr val="accent1"/>
-              </a:buClr>
-              <a:buSzPct val="80000"/>
-              <a:buFont typeface="Wingdings 3" charset="2"/>
-              <a:buChar char=""/>
-              <a:defRPr sz="1600" kern="1200">
-                <a:solidFill>
-                  <a:schemeClr val="tx1">
-                    <a:lumMod val="75000"/>
-                    <a:lumOff val="25000"/>
-                  </a:schemeClr>
-                </a:solidFill>
-                <a:latin typeface="+mn-lt"/>
-                <a:ea typeface="+mn-ea"/>
-                <a:cs typeface="+mn-cs"/>
-              </a:defRPr>
-            </a:lvl2pPr>
-            <a:lvl3pPr marL="1143000" indent="-228600" algn="l" defTabSz="457200" rtl="0" eaLnBrk="1" latinLnBrk="0" hangingPunct="1">
-              <a:spcBef>
-                <a:spcPts val="1000"/>
-              </a:spcBef>
-              <a:spcAft>
-                <a:spcPts val="0"/>
-              </a:spcAft>
-              <a:buClr>
-                <a:schemeClr val="accent1"/>
-              </a:buClr>
-              <a:buSzPct val="80000"/>
-              <a:buFont typeface="Wingdings 3" charset="2"/>
-              <a:buChar char=""/>
-              <a:defRPr sz="1400" kern="1200">
-                <a:solidFill>
-                  <a:schemeClr val="tx1">
-                    <a:lumMod val="75000"/>
-                    <a:lumOff val="25000"/>
-                  </a:schemeClr>
-                </a:solidFill>
-                <a:latin typeface="+mn-lt"/>
-                <a:ea typeface="+mn-ea"/>
-                <a:cs typeface="+mn-cs"/>
-              </a:defRPr>
-            </a:lvl3pPr>
-            <a:lvl4pPr marL="1600200" indent="-228600" algn="l" defTabSz="457200" rtl="0" eaLnBrk="1" latinLnBrk="0" hangingPunct="1">
-              <a:spcBef>
-                <a:spcPts val="1000"/>
-              </a:spcBef>
-              <a:spcAft>
-                <a:spcPts val="0"/>
-              </a:spcAft>
-              <a:buClr>
-                <a:schemeClr val="accent1"/>
-              </a:buClr>
-              <a:buSzPct val="80000"/>
-              <a:buFont typeface="Wingdings 3" charset="2"/>
-              <a:buChar char=""/>
-              <a:defRPr sz="1200" kern="1200">
-                <a:solidFill>
-                  <a:schemeClr val="tx1">
-                    <a:lumMod val="75000"/>
-                    <a:lumOff val="25000"/>
-                  </a:schemeClr>
-                </a:solidFill>
-                <a:latin typeface="+mn-lt"/>
-                <a:ea typeface="+mn-ea"/>
-                <a:cs typeface="+mn-cs"/>
-              </a:defRPr>
-            </a:lvl4pPr>
-            <a:lvl5pPr marL="2057400" indent="-228600" algn="l" defTabSz="457200" rtl="0" eaLnBrk="1" latinLnBrk="0" hangingPunct="1">
-              <a:spcBef>
-                <a:spcPts val="1000"/>
-              </a:spcBef>
-              <a:spcAft>
-                <a:spcPts val="0"/>
-              </a:spcAft>
-              <a:buClr>
-                <a:schemeClr val="accent1"/>
-              </a:buClr>
-              <a:buSzPct val="80000"/>
-              <a:buFont typeface="Wingdings 3" charset="2"/>
-              <a:buChar char=""/>
-              <a:defRPr sz="1200" kern="1200">
-                <a:solidFill>
-                  <a:schemeClr val="tx1">
-                    <a:lumMod val="75000"/>
-                    <a:lumOff val="25000"/>
-                  </a:schemeClr>
-                </a:solidFill>
-                <a:latin typeface="+mn-lt"/>
-                <a:ea typeface="+mn-ea"/>
-                <a:cs typeface="+mn-cs"/>
-              </a:defRPr>
-            </a:lvl5pPr>
-            <a:lvl6pPr marL="2514600" indent="-228600" algn="l" defTabSz="457200" rtl="0" eaLnBrk="1" latinLnBrk="0" hangingPunct="1">
-              <a:spcBef>
-                <a:spcPts val="1000"/>
-              </a:spcBef>
-              <a:spcAft>
-                <a:spcPts val="0"/>
-              </a:spcAft>
-              <a:buClr>
-                <a:schemeClr val="accent1"/>
-              </a:buClr>
-              <a:buSzPct val="80000"/>
-              <a:buFont typeface="Wingdings 3" charset="2"/>
-              <a:buChar char=""/>
-              <a:defRPr sz="1200" kern="1200">
-                <a:solidFill>
-                  <a:schemeClr val="tx1">
-                    <a:lumMod val="75000"/>
-                    <a:lumOff val="25000"/>
-                  </a:schemeClr>
-                </a:solidFill>
-                <a:latin typeface="+mn-lt"/>
-                <a:ea typeface="+mn-ea"/>
-                <a:cs typeface="+mn-cs"/>
-              </a:defRPr>
-            </a:lvl6pPr>
-            <a:lvl7pPr marL="2971800" indent="-228600" algn="l" defTabSz="457200" rtl="0" eaLnBrk="1" latinLnBrk="0" hangingPunct="1">
-              <a:spcBef>
-                <a:spcPts val="1000"/>
-              </a:spcBef>
-              <a:spcAft>
-                <a:spcPts val="0"/>
-              </a:spcAft>
-              <a:buClr>
-                <a:schemeClr val="accent1"/>
-              </a:buClr>
-              <a:buSzPct val="80000"/>
-              <a:buFont typeface="Wingdings 3" charset="2"/>
-              <a:buChar char=""/>
-              <a:defRPr sz="1200" kern="1200">
-                <a:solidFill>
-                  <a:schemeClr val="tx1">
-                    <a:lumMod val="75000"/>
-                    <a:lumOff val="25000"/>
-                  </a:schemeClr>
-                </a:solidFill>
-                <a:latin typeface="+mn-lt"/>
-                <a:ea typeface="+mn-ea"/>
-                <a:cs typeface="+mn-cs"/>
-              </a:defRPr>
-            </a:lvl7pPr>
-            <a:lvl8pPr marL="3429000" indent="-228600" algn="l" defTabSz="457200" rtl="0" eaLnBrk="1" latinLnBrk="0" hangingPunct="1">
-              <a:spcBef>
-                <a:spcPts val="1000"/>
-              </a:spcBef>
-              <a:spcAft>
-                <a:spcPts val="0"/>
-              </a:spcAft>
-              <a:buClr>
-                <a:schemeClr val="accent1"/>
-              </a:buClr>
-              <a:buSzPct val="80000"/>
-              <a:buFont typeface="Wingdings 3" charset="2"/>
-              <a:buChar char=""/>
-              <a:defRPr sz="1200" kern="1200">
-                <a:solidFill>
-                  <a:schemeClr val="tx1">
-                    <a:lumMod val="75000"/>
-                    <a:lumOff val="25000"/>
-                  </a:schemeClr>
-                </a:solidFill>
-                <a:latin typeface="+mn-lt"/>
-                <a:ea typeface="+mn-ea"/>
-                <a:cs typeface="+mn-cs"/>
-              </a:defRPr>
-            </a:lvl8pPr>
-            <a:lvl9pPr marL="3886200" indent="-228600" algn="l" defTabSz="457200" rtl="0" eaLnBrk="1" latinLnBrk="0" hangingPunct="1">
-              <a:spcBef>
-                <a:spcPts val="1000"/>
-              </a:spcBef>
-              <a:spcAft>
-                <a:spcPts val="0"/>
-              </a:spcAft>
-              <a:buClr>
-                <a:schemeClr val="accent1"/>
-              </a:buClr>
-              <a:buSzPct val="80000"/>
-              <a:buFont typeface="Wingdings 3" charset="2"/>
-              <a:buChar char=""/>
-              <a:defRPr sz="1200" kern="1200">
-                <a:solidFill>
-                  <a:schemeClr val="tx1">
-                    <a:lumMod val="75000"/>
-                    <a:lumOff val="25000"/>
-                  </a:schemeClr>
-                </a:solidFill>
-                <a:latin typeface="+mn-lt"/>
-                <a:ea typeface="+mn-ea"/>
-                <a:cs typeface="+mn-cs"/>
-              </a:defRPr>
-            </a:lvl9pPr>
-          </a:lstStyle>
-          <a:p>
-            <a:r>
-              <a:rPr lang="en-US" sz="2400" dirty="0"/>
-              <a:t>Genes associated with plasma viral load, while adjusting for age and sex of participants.</a:t>
-            </a:r>
-          </a:p>
-          <a:p>
-            <a:pPr lvl="1"/>
-            <a:r>
-              <a:rPr lang="en-US" sz="1800" dirty="0"/>
-              <a:t>Transformed of normalized counts ~ plasma viral load + age + gender</a:t>
-            </a:r>
-          </a:p>
-          <a:p>
-            <a:pPr lvl="1"/>
-            <a:r>
-              <a:rPr lang="en-US" sz="1800" dirty="0"/>
-              <a:t>Summary table of the coefficient and p-value of plasma viral load.  </a:t>
-            </a:r>
-          </a:p>
-        </p:txBody>
-      </p:sp>
     </p:spTree>
     <p:extLst>
       <p:ext uri="{BB962C8B-B14F-4D97-AF65-F5344CB8AC3E}">
-        <p14:creationId xmlns:p14="http://schemas.microsoft.com/office/powerpoint/2010/main" val="1254519171"/>
+        <p14:creationId xmlns:p14="http://schemas.microsoft.com/office/powerpoint/2010/main" val="2409549716"/>
       </p:ext>
     </p:extLst>
   </p:cSld>
@@ -7921,6 +7621,41 @@
       </p:grpSpPr>
       <p:sp>
         <p:nvSpPr>
+          <p:cNvPr id="2" name="Title 1">
+            <a:extLst>
+              <a:ext uri="{FF2B5EF4-FFF2-40B4-BE49-F238E27FC236}">
+                <a16:creationId xmlns:a16="http://schemas.microsoft.com/office/drawing/2014/main" id="{E534FB88-4BC9-4E26-B30D-D0F59F50FDAE}"/>
+              </a:ext>
+            </a:extLst>
+          </p:cNvPr>
+          <p:cNvSpPr>
+            <a:spLocks noGrp="1"/>
+          </p:cNvSpPr>
+          <p:nvPr>
+            <p:ph type="title"/>
+          </p:nvPr>
+        </p:nvSpPr>
+        <p:spPr>
+          <a:xfrm>
+            <a:off x="277283" y="318619"/>
+            <a:ext cx="9590617" cy="1032769"/>
+          </a:xfrm>
+        </p:spPr>
+        <p:txBody>
+          <a:bodyPr>
+            <a:normAutofit fontScale="90000"/>
+          </a:bodyPr>
+          <a:lstStyle/>
+          <a:p>
+            <a:r>
+              <a:rPr lang="en-US" sz="4400" dirty="0"/>
+              <a:t>Core ISGs, IFN-beta Genes and Viral Load </a:t>
+            </a:r>
+          </a:p>
+        </p:txBody>
+      </p:sp>
+      <p:sp>
+        <p:nvSpPr>
           <p:cNvPr id="3" name="Content Placeholder 2">
             <a:extLst>
               <a:ext uri="{FF2B5EF4-FFF2-40B4-BE49-F238E27FC236}">
@@ -7952,119 +7687,12 @@
           </a:p>
         </p:txBody>
       </p:sp>
-      <p:sp>
-        <p:nvSpPr>
-          <p:cNvPr id="6" name="Title 1">
+      <p:pic>
+        <p:nvPicPr>
+          <p:cNvPr id="4" name="Picture 3">
             <a:extLst>
               <a:ext uri="{FF2B5EF4-FFF2-40B4-BE49-F238E27FC236}">
-                <a16:creationId xmlns:a16="http://schemas.microsoft.com/office/drawing/2014/main" id="{C9FE729A-FAD0-4BDD-85BC-4CA2D48E7CC0}"/>
-              </a:ext>
-            </a:extLst>
-          </p:cNvPr>
-          <p:cNvSpPr txBox="1">
-            <a:spLocks/>
-          </p:cNvSpPr>
-          <p:nvPr/>
-        </p:nvSpPr>
-        <p:spPr>
-          <a:xfrm>
-            <a:off x="277283" y="318619"/>
-            <a:ext cx="9590617" cy="1032769"/>
-          </a:xfrm>
-          <a:prstGeom prst="rect">
-            <a:avLst/>
-          </a:prstGeom>
-        </p:spPr>
-        <p:txBody>
-          <a:bodyPr vert="horz" lIns="91440" tIns="45720" rIns="91440" bIns="45720" rtlCol="0" anchor="t">
-            <a:normAutofit fontScale="97500"/>
-          </a:bodyPr>
-          <a:lstStyle>
-            <a:lvl1pPr algn="l" defTabSz="457200" rtl="0" eaLnBrk="1" latinLnBrk="0" hangingPunct="1">
-              <a:spcBef>
-                <a:spcPct val="0"/>
-              </a:spcBef>
-              <a:buNone/>
-              <a:defRPr sz="3600" kern="1200">
-                <a:solidFill>
-                  <a:schemeClr val="accent1"/>
-                </a:solidFill>
-                <a:latin typeface="+mj-lt"/>
-                <a:ea typeface="+mj-ea"/>
-                <a:cs typeface="+mj-cs"/>
-              </a:defRPr>
-            </a:lvl1pPr>
-            <a:lvl2pPr eaLnBrk="1" hangingPunct="1">
-              <a:defRPr>
-                <a:solidFill>
-                  <a:schemeClr val="tx2"/>
-                </a:solidFill>
-              </a:defRPr>
-            </a:lvl2pPr>
-            <a:lvl3pPr eaLnBrk="1" hangingPunct="1">
-              <a:defRPr>
-                <a:solidFill>
-                  <a:schemeClr val="tx2"/>
-                </a:solidFill>
-              </a:defRPr>
-            </a:lvl3pPr>
-            <a:lvl4pPr eaLnBrk="1" hangingPunct="1">
-              <a:defRPr>
-                <a:solidFill>
-                  <a:schemeClr val="tx2"/>
-                </a:solidFill>
-              </a:defRPr>
-            </a:lvl4pPr>
-            <a:lvl5pPr eaLnBrk="1" hangingPunct="1">
-              <a:defRPr>
-                <a:solidFill>
-                  <a:schemeClr val="tx2"/>
-                </a:solidFill>
-              </a:defRPr>
-            </a:lvl5pPr>
-            <a:lvl6pPr eaLnBrk="1" hangingPunct="1">
-              <a:defRPr>
-                <a:solidFill>
-                  <a:schemeClr val="tx2"/>
-                </a:solidFill>
-              </a:defRPr>
-            </a:lvl6pPr>
-            <a:lvl7pPr eaLnBrk="1" hangingPunct="1">
-              <a:defRPr>
-                <a:solidFill>
-                  <a:schemeClr val="tx2"/>
-                </a:solidFill>
-              </a:defRPr>
-            </a:lvl7pPr>
-            <a:lvl8pPr eaLnBrk="1" hangingPunct="1">
-              <a:defRPr>
-                <a:solidFill>
-                  <a:schemeClr val="tx2"/>
-                </a:solidFill>
-              </a:defRPr>
-            </a:lvl8pPr>
-            <a:lvl9pPr eaLnBrk="1" hangingPunct="1">
-              <a:defRPr>
-                <a:solidFill>
-                  <a:schemeClr val="tx2"/>
-                </a:solidFill>
-              </a:defRPr>
-            </a:lvl9pPr>
-          </a:lstStyle>
-          <a:p>
-            <a:r>
-              <a:rPr lang="en-US" sz="4400" dirty="0"/>
-              <a:t>Core ISGs, IFN-beta Genes and CD4</a:t>
-            </a:r>
-          </a:p>
-        </p:txBody>
-      </p:sp>
-      <p:pic>
-        <p:nvPicPr>
-          <p:cNvPr id="7" name="Picture 6">
-            <a:extLst>
-              <a:ext uri="{FF2B5EF4-FFF2-40B4-BE49-F238E27FC236}">
-                <a16:creationId xmlns:a16="http://schemas.microsoft.com/office/drawing/2014/main" id="{E7632A8A-E805-4C0F-A47A-B87B922B71D7}"/>
+                <a16:creationId xmlns:a16="http://schemas.microsoft.com/office/drawing/2014/main" id="{5E14F700-5C15-412A-BF30-578DB4EAE9F4}"/>
               </a:ext>
             </a:extLst>
           </p:cNvPr>
@@ -8081,8 +7709,8 @@
         </p:blipFill>
         <p:spPr>
           <a:xfrm>
-            <a:off x="277283" y="1181101"/>
-            <a:ext cx="5619750" cy="3009900"/>
+            <a:off x="439209" y="1455438"/>
+            <a:ext cx="5286555" cy="2973687"/>
           </a:xfrm>
           <a:prstGeom prst="rect">
             <a:avLst/>
@@ -8091,10 +7719,10 @@
       </p:pic>
       <p:pic>
         <p:nvPicPr>
-          <p:cNvPr id="8" name="Picture 7">
+          <p:cNvPr id="5" name="Picture 4">
             <a:extLst>
               <a:ext uri="{FF2B5EF4-FFF2-40B4-BE49-F238E27FC236}">
-                <a16:creationId xmlns:a16="http://schemas.microsoft.com/office/drawing/2014/main" id="{B388F0EE-0C9B-43CF-956D-7A372E2E9BB3}"/>
+                <a16:creationId xmlns:a16="http://schemas.microsoft.com/office/drawing/2014/main" id="{B9511C8E-AEC3-4340-B677-4F87EE008B14}"/>
               </a:ext>
             </a:extLst>
           </p:cNvPr>
@@ -8111,8 +7739,8 @@
         </p:blipFill>
         <p:spPr>
           <a:xfrm>
-            <a:off x="6096000" y="1181101"/>
-            <a:ext cx="5418666" cy="3332636"/>
+            <a:off x="6077413" y="1351388"/>
+            <a:ext cx="5419205" cy="3077737"/>
           </a:xfrm>
           <a:prstGeom prst="rect">
             <a:avLst/>
@@ -8121,10 +7749,10 @@
       </p:pic>
       <p:sp>
         <p:nvSpPr>
-          <p:cNvPr id="9" name="Content Placeholder 2">
+          <p:cNvPr id="6" name="Content Placeholder 2">
             <a:extLst>
               <a:ext uri="{FF2B5EF4-FFF2-40B4-BE49-F238E27FC236}">
-                <a16:creationId xmlns:a16="http://schemas.microsoft.com/office/drawing/2014/main" id="{B3722640-8C34-4264-9720-353F777A3262}"/>
+                <a16:creationId xmlns:a16="http://schemas.microsoft.com/office/drawing/2014/main" id="{7067C4C8-74CB-41C7-A8FB-91680BDFB405}"/>
               </a:ext>
             </a:extLst>
           </p:cNvPr>
@@ -8376,21 +8004,21 @@
           <a:p>
             <a:r>
               <a:rPr lang="en-US" sz="2400" dirty="0"/>
-              <a:t>Genes associated with CD4 counts, while adjusting for age and sex of participants.</a:t>
+              <a:t>Genes associated with plasma viral load, while adjusting for age and sex of participants.</a:t>
             </a:r>
           </a:p>
           <a:p>
             <a:pPr lvl="1"/>
             <a:r>
               <a:rPr lang="en-US" sz="1800" dirty="0"/>
-              <a:t>Transformed of normalized counts ~ CD4 counts + age + gender</a:t>
+              <a:t>Transformed of normalized counts ~ plasma viral load + age + gender</a:t>
             </a:r>
           </a:p>
           <a:p>
             <a:pPr lvl="1"/>
             <a:r>
               <a:rPr lang="en-US" sz="1800" dirty="0"/>
-              <a:t>Summary table of the coefficient and p-value of CD4 counts.  </a:t>
+              <a:t>Summary table of the coefficient and p-value of plasma viral load.  </a:t>
             </a:r>
           </a:p>
         </p:txBody>
@@ -8398,7 +8026,7 @@
     </p:spTree>
     <p:extLst>
       <p:ext uri="{BB962C8B-B14F-4D97-AF65-F5344CB8AC3E}">
-        <p14:creationId xmlns:p14="http://schemas.microsoft.com/office/powerpoint/2010/main" val="1997668701"/>
+        <p14:creationId xmlns:p14="http://schemas.microsoft.com/office/powerpoint/2010/main" val="1254519171"/>
       </p:ext>
     </p:extLst>
   </p:cSld>
@@ -8579,41 +8207,6 @@
       </p:grpSpPr>
       <p:sp>
         <p:nvSpPr>
-          <p:cNvPr id="2" name="Title 1">
-            <a:extLst>
-              <a:ext uri="{FF2B5EF4-FFF2-40B4-BE49-F238E27FC236}">
-                <a16:creationId xmlns:a16="http://schemas.microsoft.com/office/drawing/2014/main" id="{E534FB88-4BC9-4E26-B30D-D0F59F50FDAE}"/>
-              </a:ext>
-            </a:extLst>
-          </p:cNvPr>
-          <p:cNvSpPr>
-            <a:spLocks noGrp="1"/>
-          </p:cNvSpPr>
-          <p:nvPr>
-            <p:ph type="title"/>
-          </p:nvPr>
-        </p:nvSpPr>
-        <p:spPr>
-          <a:xfrm>
-            <a:off x="677334" y="609600"/>
-            <a:ext cx="8596668" cy="1032769"/>
-          </a:xfrm>
-        </p:spPr>
-        <p:txBody>
-          <a:bodyPr>
-            <a:normAutofit/>
-          </a:bodyPr>
-          <a:lstStyle/>
-          <a:p>
-            <a:r>
-              <a:rPr lang="en-US" sz="4400" dirty="0"/>
-              <a:t>Differences between gene lists</a:t>
-            </a:r>
-          </a:p>
-        </p:txBody>
-      </p:sp>
-      <p:sp>
-        <p:nvSpPr>
           <p:cNvPr id="3" name="Content Placeholder 2">
             <a:extLst>
               <a:ext uri="{FF2B5EF4-FFF2-40B4-BE49-F238E27FC236}">
@@ -8645,12 +8238,119 @@
           </a:p>
         </p:txBody>
       </p:sp>
+      <p:sp>
+        <p:nvSpPr>
+          <p:cNvPr id="6" name="Title 1">
+            <a:extLst>
+              <a:ext uri="{FF2B5EF4-FFF2-40B4-BE49-F238E27FC236}">
+                <a16:creationId xmlns:a16="http://schemas.microsoft.com/office/drawing/2014/main" id="{C9FE729A-FAD0-4BDD-85BC-4CA2D48E7CC0}"/>
+              </a:ext>
+            </a:extLst>
+          </p:cNvPr>
+          <p:cNvSpPr txBox="1">
+            <a:spLocks/>
+          </p:cNvSpPr>
+          <p:nvPr/>
+        </p:nvSpPr>
+        <p:spPr>
+          <a:xfrm>
+            <a:off x="277283" y="318619"/>
+            <a:ext cx="9590617" cy="1032769"/>
+          </a:xfrm>
+          <a:prstGeom prst="rect">
+            <a:avLst/>
+          </a:prstGeom>
+        </p:spPr>
+        <p:txBody>
+          <a:bodyPr vert="horz" lIns="91440" tIns="45720" rIns="91440" bIns="45720" rtlCol="0" anchor="t">
+            <a:normAutofit fontScale="97500"/>
+          </a:bodyPr>
+          <a:lstStyle>
+            <a:lvl1pPr algn="l" defTabSz="457200" rtl="0" eaLnBrk="1" latinLnBrk="0" hangingPunct="1">
+              <a:spcBef>
+                <a:spcPct val="0"/>
+              </a:spcBef>
+              <a:buNone/>
+              <a:defRPr sz="3600" kern="1200">
+                <a:solidFill>
+                  <a:schemeClr val="accent1"/>
+                </a:solidFill>
+                <a:latin typeface="+mj-lt"/>
+                <a:ea typeface="+mj-ea"/>
+                <a:cs typeface="+mj-cs"/>
+              </a:defRPr>
+            </a:lvl1pPr>
+            <a:lvl2pPr eaLnBrk="1" hangingPunct="1">
+              <a:defRPr>
+                <a:solidFill>
+                  <a:schemeClr val="tx2"/>
+                </a:solidFill>
+              </a:defRPr>
+            </a:lvl2pPr>
+            <a:lvl3pPr eaLnBrk="1" hangingPunct="1">
+              <a:defRPr>
+                <a:solidFill>
+                  <a:schemeClr val="tx2"/>
+                </a:solidFill>
+              </a:defRPr>
+            </a:lvl3pPr>
+            <a:lvl4pPr eaLnBrk="1" hangingPunct="1">
+              <a:defRPr>
+                <a:solidFill>
+                  <a:schemeClr val="tx2"/>
+                </a:solidFill>
+              </a:defRPr>
+            </a:lvl4pPr>
+            <a:lvl5pPr eaLnBrk="1" hangingPunct="1">
+              <a:defRPr>
+                <a:solidFill>
+                  <a:schemeClr val="tx2"/>
+                </a:solidFill>
+              </a:defRPr>
+            </a:lvl5pPr>
+            <a:lvl6pPr eaLnBrk="1" hangingPunct="1">
+              <a:defRPr>
+                <a:solidFill>
+                  <a:schemeClr val="tx2"/>
+                </a:solidFill>
+              </a:defRPr>
+            </a:lvl6pPr>
+            <a:lvl7pPr eaLnBrk="1" hangingPunct="1">
+              <a:defRPr>
+                <a:solidFill>
+                  <a:schemeClr val="tx2"/>
+                </a:solidFill>
+              </a:defRPr>
+            </a:lvl7pPr>
+            <a:lvl8pPr eaLnBrk="1" hangingPunct="1">
+              <a:defRPr>
+                <a:solidFill>
+                  <a:schemeClr val="tx2"/>
+                </a:solidFill>
+              </a:defRPr>
+            </a:lvl8pPr>
+            <a:lvl9pPr eaLnBrk="1" hangingPunct="1">
+              <a:defRPr>
+                <a:solidFill>
+                  <a:schemeClr val="tx2"/>
+                </a:solidFill>
+              </a:defRPr>
+            </a:lvl9pPr>
+          </a:lstStyle>
+          <a:p>
+            <a:r>
+              <a:rPr lang="en-US" sz="4400" dirty="0"/>
+              <a:t>Core ISGs, IFN-beta Genes and CD4</a:t>
+            </a:r>
+          </a:p>
+        </p:txBody>
+      </p:sp>
       <p:pic>
         <p:nvPicPr>
-          <p:cNvPr id="4" name="Picture 3">
+          <p:cNvPr id="7" name="Picture 6">
             <a:extLst>
               <a:ext uri="{FF2B5EF4-FFF2-40B4-BE49-F238E27FC236}">
-                <a16:creationId xmlns:a16="http://schemas.microsoft.com/office/drawing/2014/main" id="{A54B9C6D-8DE9-4B0E-8781-CF50687918B1}"/>
+                <a16:creationId xmlns:a16="http://schemas.microsoft.com/office/drawing/2014/main" id="{E7632A8A-E805-4C0F-A47A-B87B922B71D7}"/>
               </a:ext>
             </a:extLst>
           </p:cNvPr>
@@ -8667,8 +8367,8 @@
         </p:blipFill>
         <p:spPr>
           <a:xfrm>
-            <a:off x="677334" y="1716262"/>
-            <a:ext cx="5334462" cy="3292125"/>
+            <a:off x="277283" y="1181101"/>
+            <a:ext cx="5619750" cy="3009900"/>
           </a:xfrm>
           <a:prstGeom prst="rect">
             <a:avLst/>
@@ -8677,10 +8377,10 @@
       </p:pic>
       <p:pic>
         <p:nvPicPr>
-          <p:cNvPr id="5" name="Picture 4">
+          <p:cNvPr id="8" name="Picture 7">
             <a:extLst>
               <a:ext uri="{FF2B5EF4-FFF2-40B4-BE49-F238E27FC236}">
-                <a16:creationId xmlns:a16="http://schemas.microsoft.com/office/drawing/2014/main" id="{C22DAE30-23E8-4328-B141-ECB720EFF8FB}"/>
+                <a16:creationId xmlns:a16="http://schemas.microsoft.com/office/drawing/2014/main" id="{B388F0EE-0C9B-43CF-956D-7A372E2E9BB3}"/>
               </a:ext>
             </a:extLst>
           </p:cNvPr>
@@ -8697,18 +8397,294 @@
         </p:blipFill>
         <p:spPr>
           <a:xfrm>
-            <a:off x="6476769" y="1782937"/>
-            <a:ext cx="5334462" cy="3292125"/>
+            <a:off x="6096000" y="1181101"/>
+            <a:ext cx="5418666" cy="3332636"/>
           </a:xfrm>
           <a:prstGeom prst="rect">
             <a:avLst/>
           </a:prstGeom>
         </p:spPr>
       </p:pic>
+      <p:sp>
+        <p:nvSpPr>
+          <p:cNvPr id="9" name="Content Placeholder 2">
+            <a:extLst>
+              <a:ext uri="{FF2B5EF4-FFF2-40B4-BE49-F238E27FC236}">
+                <a16:creationId xmlns:a16="http://schemas.microsoft.com/office/drawing/2014/main" id="{B3722640-8C34-4264-9720-353F777A3262}"/>
+              </a:ext>
+            </a:extLst>
+          </p:cNvPr>
+          <p:cNvSpPr txBox="1">
+            <a:spLocks/>
+          </p:cNvSpPr>
+          <p:nvPr/>
+        </p:nvSpPr>
+        <p:spPr>
+          <a:xfrm>
+            <a:off x="915459" y="4676318"/>
+            <a:ext cx="8596668" cy="1660588"/>
+          </a:xfrm>
+          <a:prstGeom prst="rect">
+            <a:avLst/>
+          </a:prstGeom>
+        </p:spPr>
+        <p:txBody>
+          <a:bodyPr vert="horz" lIns="91440" tIns="45720" rIns="91440" bIns="45720" rtlCol="0">
+            <a:normAutofit/>
+          </a:bodyPr>
+          <a:lstStyle>
+            <a:lvl1pPr marL="342900" indent="-342900" algn="l" defTabSz="457200" rtl="0" eaLnBrk="1" latinLnBrk="0" hangingPunct="1">
+              <a:spcBef>
+                <a:spcPts val="1000"/>
+              </a:spcBef>
+              <a:spcAft>
+                <a:spcPts val="0"/>
+              </a:spcAft>
+              <a:buClr>
+                <a:schemeClr val="accent1"/>
+              </a:buClr>
+              <a:buSzPct val="80000"/>
+              <a:buFont typeface="Wingdings 3" charset="2"/>
+              <a:buChar char=""/>
+              <a:defRPr sz="1800" kern="1200">
+                <a:solidFill>
+                  <a:schemeClr val="tx1">
+                    <a:lumMod val="75000"/>
+                    <a:lumOff val="25000"/>
+                  </a:schemeClr>
+                </a:solidFill>
+                <a:latin typeface="+mn-lt"/>
+                <a:ea typeface="+mn-ea"/>
+                <a:cs typeface="+mn-cs"/>
+              </a:defRPr>
+            </a:lvl1pPr>
+            <a:lvl2pPr marL="742950" indent="-285750" algn="l" defTabSz="457200" rtl="0" eaLnBrk="1" latinLnBrk="0" hangingPunct="1">
+              <a:spcBef>
+                <a:spcPts val="1000"/>
+              </a:spcBef>
+              <a:spcAft>
+                <a:spcPts val="0"/>
+              </a:spcAft>
+              <a:buClr>
+                <a:schemeClr val="accent1"/>
+              </a:buClr>
+              <a:buSzPct val="80000"/>
+              <a:buFont typeface="Wingdings 3" charset="2"/>
+              <a:buChar char=""/>
+              <a:defRPr sz="1600" kern="1200">
+                <a:solidFill>
+                  <a:schemeClr val="tx1">
+                    <a:lumMod val="75000"/>
+                    <a:lumOff val="25000"/>
+                  </a:schemeClr>
+                </a:solidFill>
+                <a:latin typeface="+mn-lt"/>
+                <a:ea typeface="+mn-ea"/>
+                <a:cs typeface="+mn-cs"/>
+              </a:defRPr>
+            </a:lvl2pPr>
+            <a:lvl3pPr marL="1143000" indent="-228600" algn="l" defTabSz="457200" rtl="0" eaLnBrk="1" latinLnBrk="0" hangingPunct="1">
+              <a:spcBef>
+                <a:spcPts val="1000"/>
+              </a:spcBef>
+              <a:spcAft>
+                <a:spcPts val="0"/>
+              </a:spcAft>
+              <a:buClr>
+                <a:schemeClr val="accent1"/>
+              </a:buClr>
+              <a:buSzPct val="80000"/>
+              <a:buFont typeface="Wingdings 3" charset="2"/>
+              <a:buChar char=""/>
+              <a:defRPr sz="1400" kern="1200">
+                <a:solidFill>
+                  <a:schemeClr val="tx1">
+                    <a:lumMod val="75000"/>
+                    <a:lumOff val="25000"/>
+                  </a:schemeClr>
+                </a:solidFill>
+                <a:latin typeface="+mn-lt"/>
+                <a:ea typeface="+mn-ea"/>
+                <a:cs typeface="+mn-cs"/>
+              </a:defRPr>
+            </a:lvl3pPr>
+            <a:lvl4pPr marL="1600200" indent="-228600" algn="l" defTabSz="457200" rtl="0" eaLnBrk="1" latinLnBrk="0" hangingPunct="1">
+              <a:spcBef>
+                <a:spcPts val="1000"/>
+              </a:spcBef>
+              <a:spcAft>
+                <a:spcPts val="0"/>
+              </a:spcAft>
+              <a:buClr>
+                <a:schemeClr val="accent1"/>
+              </a:buClr>
+              <a:buSzPct val="80000"/>
+              <a:buFont typeface="Wingdings 3" charset="2"/>
+              <a:buChar char=""/>
+              <a:defRPr sz="1200" kern="1200">
+                <a:solidFill>
+                  <a:schemeClr val="tx1">
+                    <a:lumMod val="75000"/>
+                    <a:lumOff val="25000"/>
+                  </a:schemeClr>
+                </a:solidFill>
+                <a:latin typeface="+mn-lt"/>
+                <a:ea typeface="+mn-ea"/>
+                <a:cs typeface="+mn-cs"/>
+              </a:defRPr>
+            </a:lvl4pPr>
+            <a:lvl5pPr marL="2057400" indent="-228600" algn="l" defTabSz="457200" rtl="0" eaLnBrk="1" latinLnBrk="0" hangingPunct="1">
+              <a:spcBef>
+                <a:spcPts val="1000"/>
+              </a:spcBef>
+              <a:spcAft>
+                <a:spcPts val="0"/>
+              </a:spcAft>
+              <a:buClr>
+                <a:schemeClr val="accent1"/>
+              </a:buClr>
+              <a:buSzPct val="80000"/>
+              <a:buFont typeface="Wingdings 3" charset="2"/>
+              <a:buChar char=""/>
+              <a:defRPr sz="1200" kern="1200">
+                <a:solidFill>
+                  <a:schemeClr val="tx1">
+                    <a:lumMod val="75000"/>
+                    <a:lumOff val="25000"/>
+                  </a:schemeClr>
+                </a:solidFill>
+                <a:latin typeface="+mn-lt"/>
+                <a:ea typeface="+mn-ea"/>
+                <a:cs typeface="+mn-cs"/>
+              </a:defRPr>
+            </a:lvl5pPr>
+            <a:lvl6pPr marL="2514600" indent="-228600" algn="l" defTabSz="457200" rtl="0" eaLnBrk="1" latinLnBrk="0" hangingPunct="1">
+              <a:spcBef>
+                <a:spcPts val="1000"/>
+              </a:spcBef>
+              <a:spcAft>
+                <a:spcPts val="0"/>
+              </a:spcAft>
+              <a:buClr>
+                <a:schemeClr val="accent1"/>
+              </a:buClr>
+              <a:buSzPct val="80000"/>
+              <a:buFont typeface="Wingdings 3" charset="2"/>
+              <a:buChar char=""/>
+              <a:defRPr sz="1200" kern="1200">
+                <a:solidFill>
+                  <a:schemeClr val="tx1">
+                    <a:lumMod val="75000"/>
+                    <a:lumOff val="25000"/>
+                  </a:schemeClr>
+                </a:solidFill>
+                <a:latin typeface="+mn-lt"/>
+                <a:ea typeface="+mn-ea"/>
+                <a:cs typeface="+mn-cs"/>
+              </a:defRPr>
+            </a:lvl6pPr>
+            <a:lvl7pPr marL="2971800" indent="-228600" algn="l" defTabSz="457200" rtl="0" eaLnBrk="1" latinLnBrk="0" hangingPunct="1">
+              <a:spcBef>
+                <a:spcPts val="1000"/>
+              </a:spcBef>
+              <a:spcAft>
+                <a:spcPts val="0"/>
+              </a:spcAft>
+              <a:buClr>
+                <a:schemeClr val="accent1"/>
+              </a:buClr>
+              <a:buSzPct val="80000"/>
+              <a:buFont typeface="Wingdings 3" charset="2"/>
+              <a:buChar char=""/>
+              <a:defRPr sz="1200" kern="1200">
+                <a:solidFill>
+                  <a:schemeClr val="tx1">
+                    <a:lumMod val="75000"/>
+                    <a:lumOff val="25000"/>
+                  </a:schemeClr>
+                </a:solidFill>
+                <a:latin typeface="+mn-lt"/>
+                <a:ea typeface="+mn-ea"/>
+                <a:cs typeface="+mn-cs"/>
+              </a:defRPr>
+            </a:lvl7pPr>
+            <a:lvl8pPr marL="3429000" indent="-228600" algn="l" defTabSz="457200" rtl="0" eaLnBrk="1" latinLnBrk="0" hangingPunct="1">
+              <a:spcBef>
+                <a:spcPts val="1000"/>
+              </a:spcBef>
+              <a:spcAft>
+                <a:spcPts val="0"/>
+              </a:spcAft>
+              <a:buClr>
+                <a:schemeClr val="accent1"/>
+              </a:buClr>
+              <a:buSzPct val="80000"/>
+              <a:buFont typeface="Wingdings 3" charset="2"/>
+              <a:buChar char=""/>
+              <a:defRPr sz="1200" kern="1200">
+                <a:solidFill>
+                  <a:schemeClr val="tx1">
+                    <a:lumMod val="75000"/>
+                    <a:lumOff val="25000"/>
+                  </a:schemeClr>
+                </a:solidFill>
+                <a:latin typeface="+mn-lt"/>
+                <a:ea typeface="+mn-ea"/>
+                <a:cs typeface="+mn-cs"/>
+              </a:defRPr>
+            </a:lvl8pPr>
+            <a:lvl9pPr marL="3886200" indent="-228600" algn="l" defTabSz="457200" rtl="0" eaLnBrk="1" latinLnBrk="0" hangingPunct="1">
+              <a:spcBef>
+                <a:spcPts val="1000"/>
+              </a:spcBef>
+              <a:spcAft>
+                <a:spcPts val="0"/>
+              </a:spcAft>
+              <a:buClr>
+                <a:schemeClr val="accent1"/>
+              </a:buClr>
+              <a:buSzPct val="80000"/>
+              <a:buFont typeface="Wingdings 3" charset="2"/>
+              <a:buChar char=""/>
+              <a:defRPr sz="1200" kern="1200">
+                <a:solidFill>
+                  <a:schemeClr val="tx1">
+                    <a:lumMod val="75000"/>
+                    <a:lumOff val="25000"/>
+                  </a:schemeClr>
+                </a:solidFill>
+                <a:latin typeface="+mn-lt"/>
+                <a:ea typeface="+mn-ea"/>
+                <a:cs typeface="+mn-cs"/>
+              </a:defRPr>
+            </a:lvl9pPr>
+          </a:lstStyle>
+          <a:p>
+            <a:r>
+              <a:rPr lang="en-US" sz="2400" dirty="0"/>
+              <a:t>Genes associated with CD4 counts, while adjusting for age and sex of participants.</a:t>
+            </a:r>
+          </a:p>
+          <a:p>
+            <a:pPr lvl="1"/>
+            <a:r>
+              <a:rPr lang="en-US" sz="1800" dirty="0"/>
+              <a:t>Transformed of normalized counts ~ CD4 counts + age + gender</a:t>
+            </a:r>
+          </a:p>
+          <a:p>
+            <a:pPr lvl="1"/>
+            <a:r>
+              <a:rPr lang="en-US" sz="1800" dirty="0"/>
+              <a:t>Summary table of the coefficient and p-value of CD4 counts.  </a:t>
+            </a:r>
+          </a:p>
+        </p:txBody>
+      </p:sp>
     </p:spTree>
     <p:extLst>
       <p:ext uri="{BB962C8B-B14F-4D97-AF65-F5344CB8AC3E}">
-        <p14:creationId xmlns:p14="http://schemas.microsoft.com/office/powerpoint/2010/main" val="3312592980"/>
+        <p14:creationId xmlns:p14="http://schemas.microsoft.com/office/powerpoint/2010/main" val="1997668701"/>
       </p:ext>
     </p:extLst>
   </p:cSld>
@@ -8765,7 +8741,7 @@
           <a:p>
             <a:r>
               <a:rPr lang="en-US" sz="4400" dirty="0"/>
-              <a:t>To do</a:t>
+              <a:t>Differences between gene lists</a:t>
             </a:r>
           </a:p>
         </p:txBody>
@@ -8789,66 +8765,26 @@
         <p:spPr>
           <a:xfrm>
             <a:off x="677334" y="1784413"/>
-            <a:ext cx="6353781" cy="4256950"/>
+            <a:ext cx="8596668" cy="4256950"/>
           </a:xfrm>
         </p:spPr>
         <p:txBody>
           <a:bodyPr/>
           <a:lstStyle/>
           <a:p>
-            <a:pPr marL="0" indent="0">
-              <a:buNone/>
-            </a:pPr>
-            <a:endParaRPr lang="en-US" dirty="0"/>
-          </a:p>
-          <a:p>
-            <a:r>
-              <a:rPr lang="en-US" sz="2000" dirty="0"/>
-              <a:t>3d PCA plots with key genes.</a:t>
-            </a:r>
-          </a:p>
-          <a:p>
-            <a:pPr lvl="1"/>
-            <a:r>
-              <a:rPr lang="en-US" sz="1800" dirty="0"/>
-              <a:t>2d PCA plot does not have a very clear separation.</a:t>
-            </a:r>
-          </a:p>
-          <a:p>
-            <a:pPr lvl="1"/>
-            <a:r>
-              <a:rPr lang="en-US" sz="1800" dirty="0"/>
-              <a:t>Key genes to show in the 3d PCA plots.</a:t>
-            </a:r>
-          </a:p>
-          <a:p>
-            <a:pPr lvl="2"/>
-            <a:r>
-              <a:rPr lang="en-US" sz="1600" dirty="0"/>
-              <a:t>Key genes defined by the rank of the association with CD4 counts?</a:t>
-            </a:r>
-          </a:p>
-          <a:p>
-            <a:pPr lvl="1"/>
-            <a:r>
-              <a:rPr lang="en-US" sz="1800" dirty="0"/>
-              <a:t>.gif to show 3d PCA plots or just the snapshot?</a:t>
-            </a:r>
-          </a:p>
-          <a:p>
-            <a:r>
-              <a:rPr lang="en-US" sz="2000" dirty="0"/>
-              <a:t>Association with other clinical outcomes?</a:t>
-            </a:r>
+            <a:endParaRPr lang="en-US" dirty="0"/>
+          </a:p>
+          <a:p>
+            <a:endParaRPr lang="en-US" dirty="0"/>
           </a:p>
         </p:txBody>
       </p:sp>
       <p:pic>
         <p:nvPicPr>
-          <p:cNvPr id="5" name="Picture 4" descr="A close up of a map&#10;&#10;Description automatically generated">
+          <p:cNvPr id="4" name="Picture 3">
             <a:extLst>
               <a:ext uri="{FF2B5EF4-FFF2-40B4-BE49-F238E27FC236}">
-                <a16:creationId xmlns:a16="http://schemas.microsoft.com/office/drawing/2014/main" id="{3461ADB4-BDAD-4574-A4A1-A29E149C5919}"/>
+                <a16:creationId xmlns:a16="http://schemas.microsoft.com/office/drawing/2014/main" id="{A54B9C6D-8DE9-4B0E-8781-CF50687918B1}"/>
               </a:ext>
             </a:extLst>
           </p:cNvPr>
@@ -8865,8 +8801,38 @@
         </p:blipFill>
         <p:spPr>
           <a:xfrm>
-            <a:off x="7382893" y="816637"/>
-            <a:ext cx="3962400" cy="4152900"/>
+            <a:off x="677334" y="1716262"/>
+            <a:ext cx="5334462" cy="3292125"/>
+          </a:xfrm>
+          <a:prstGeom prst="rect">
+            <a:avLst/>
+          </a:prstGeom>
+        </p:spPr>
+      </p:pic>
+      <p:pic>
+        <p:nvPicPr>
+          <p:cNvPr id="5" name="Picture 4">
+            <a:extLst>
+              <a:ext uri="{FF2B5EF4-FFF2-40B4-BE49-F238E27FC236}">
+                <a16:creationId xmlns:a16="http://schemas.microsoft.com/office/drawing/2014/main" id="{C22DAE30-23E8-4328-B141-ECB720EFF8FB}"/>
+              </a:ext>
+            </a:extLst>
+          </p:cNvPr>
+          <p:cNvPicPr>
+            <a:picLocks noChangeAspect="1"/>
+          </p:cNvPicPr>
+          <p:nvPr/>
+        </p:nvPicPr>
+        <p:blipFill>
+          <a:blip r:embed="rId3"/>
+          <a:stretch>
+            <a:fillRect/>
+          </a:stretch>
+        </p:blipFill>
+        <p:spPr>
+          <a:xfrm>
+            <a:off x="6476769" y="1782937"/>
+            <a:ext cx="5334462" cy="3292125"/>
           </a:xfrm>
           <a:prstGeom prst="rect">
             <a:avLst/>
@@ -8876,7 +8842,7 @@
     </p:spTree>
     <p:extLst>
       <p:ext uri="{BB962C8B-B14F-4D97-AF65-F5344CB8AC3E}">
-        <p14:creationId xmlns:p14="http://schemas.microsoft.com/office/powerpoint/2010/main" val="2807781707"/>
+        <p14:creationId xmlns:p14="http://schemas.microsoft.com/office/powerpoint/2010/main" val="3312592980"/>
       </p:ext>
     </p:extLst>
   </p:cSld>
@@ -8933,6 +8899,174 @@
           <a:p>
             <a:r>
               <a:rPr lang="en-US" sz="4400" dirty="0"/>
+              <a:t>To do</a:t>
+            </a:r>
+          </a:p>
+        </p:txBody>
+      </p:sp>
+      <p:sp>
+        <p:nvSpPr>
+          <p:cNvPr id="3" name="Content Placeholder 2">
+            <a:extLst>
+              <a:ext uri="{FF2B5EF4-FFF2-40B4-BE49-F238E27FC236}">
+                <a16:creationId xmlns:a16="http://schemas.microsoft.com/office/drawing/2014/main" id="{DFCC80B2-B029-4B79-B879-C26B6D606B8F}"/>
+              </a:ext>
+            </a:extLst>
+          </p:cNvPr>
+          <p:cNvSpPr>
+            <a:spLocks noGrp="1"/>
+          </p:cNvSpPr>
+          <p:nvPr>
+            <p:ph idx="1"/>
+          </p:nvPr>
+        </p:nvSpPr>
+        <p:spPr>
+          <a:xfrm>
+            <a:off x="677334" y="1784413"/>
+            <a:ext cx="6353781" cy="4256950"/>
+          </a:xfrm>
+        </p:spPr>
+        <p:txBody>
+          <a:bodyPr/>
+          <a:lstStyle/>
+          <a:p>
+            <a:pPr marL="0" indent="0">
+              <a:buNone/>
+            </a:pPr>
+            <a:endParaRPr lang="en-US" dirty="0"/>
+          </a:p>
+          <a:p>
+            <a:r>
+              <a:rPr lang="en-US" sz="2000" dirty="0"/>
+              <a:t>3d PCA plots with key genes.</a:t>
+            </a:r>
+          </a:p>
+          <a:p>
+            <a:pPr lvl="1"/>
+            <a:r>
+              <a:rPr lang="en-US" sz="1800" dirty="0"/>
+              <a:t>2d PCA plot does not have a very clear separation.</a:t>
+            </a:r>
+          </a:p>
+          <a:p>
+            <a:pPr lvl="1"/>
+            <a:r>
+              <a:rPr lang="en-US" sz="1800" dirty="0"/>
+              <a:t>Key genes to show in the 3d PCA plots.</a:t>
+            </a:r>
+          </a:p>
+          <a:p>
+            <a:pPr lvl="2"/>
+            <a:r>
+              <a:rPr lang="en-US" sz="1600" dirty="0"/>
+              <a:t>Key genes defined by the rank of the association with CD4 counts?</a:t>
+            </a:r>
+          </a:p>
+          <a:p>
+            <a:pPr lvl="1"/>
+            <a:r>
+              <a:rPr lang="en-US" sz="1800" dirty="0"/>
+              <a:t>.gif to show 3d PCA plots or just the snapshot?</a:t>
+            </a:r>
+          </a:p>
+          <a:p>
+            <a:r>
+              <a:rPr lang="en-US" sz="2000" dirty="0"/>
+              <a:t>Association with other clinical outcomes?</a:t>
+            </a:r>
+          </a:p>
+        </p:txBody>
+      </p:sp>
+      <p:pic>
+        <p:nvPicPr>
+          <p:cNvPr id="5" name="Picture 4" descr="A close up of a map&#10;&#10;Description automatically generated">
+            <a:extLst>
+              <a:ext uri="{FF2B5EF4-FFF2-40B4-BE49-F238E27FC236}">
+                <a16:creationId xmlns:a16="http://schemas.microsoft.com/office/drawing/2014/main" id="{3461ADB4-BDAD-4574-A4A1-A29E149C5919}"/>
+              </a:ext>
+            </a:extLst>
+          </p:cNvPr>
+          <p:cNvPicPr>
+            <a:picLocks noChangeAspect="1"/>
+          </p:cNvPicPr>
+          <p:nvPr/>
+        </p:nvPicPr>
+        <p:blipFill>
+          <a:blip r:embed="rId2"/>
+          <a:stretch>
+            <a:fillRect/>
+          </a:stretch>
+        </p:blipFill>
+        <p:spPr>
+          <a:xfrm>
+            <a:off x="7382893" y="816637"/>
+            <a:ext cx="3962400" cy="4152900"/>
+          </a:xfrm>
+          <a:prstGeom prst="rect">
+            <a:avLst/>
+          </a:prstGeom>
+        </p:spPr>
+      </p:pic>
+    </p:spTree>
+    <p:extLst>
+      <p:ext uri="{BB962C8B-B14F-4D97-AF65-F5344CB8AC3E}">
+        <p14:creationId xmlns:p14="http://schemas.microsoft.com/office/powerpoint/2010/main" val="2807781707"/>
+      </p:ext>
+    </p:extLst>
+  </p:cSld>
+  <p:clrMapOvr>
+    <a:masterClrMapping/>
+  </p:clrMapOvr>
+</p:sld>
+</file>
+
+<file path=ppt/slides/slide23.xml><?xml version="1.0" encoding="utf-8"?>
+<p:sld xmlns:a="http://schemas.openxmlformats.org/drawingml/2006/main" xmlns:r="http://schemas.openxmlformats.org/officeDocument/2006/relationships" xmlns:p="http://schemas.openxmlformats.org/presentationml/2006/main">
+  <p:cSld>
+    <p:spTree>
+      <p:nvGrpSpPr>
+        <p:cNvPr id="1" name=""/>
+        <p:cNvGrpSpPr/>
+        <p:nvPr/>
+      </p:nvGrpSpPr>
+      <p:grpSpPr>
+        <a:xfrm>
+          <a:off x="0" y="0"/>
+          <a:ext cx="0" cy="0"/>
+          <a:chOff x="0" y="0"/>
+          <a:chExt cx="0" cy="0"/>
+        </a:xfrm>
+      </p:grpSpPr>
+      <p:sp>
+        <p:nvSpPr>
+          <p:cNvPr id="2" name="Title 1">
+            <a:extLst>
+              <a:ext uri="{FF2B5EF4-FFF2-40B4-BE49-F238E27FC236}">
+                <a16:creationId xmlns:a16="http://schemas.microsoft.com/office/drawing/2014/main" id="{E534FB88-4BC9-4E26-B30D-D0F59F50FDAE}"/>
+              </a:ext>
+            </a:extLst>
+          </p:cNvPr>
+          <p:cNvSpPr>
+            <a:spLocks noGrp="1"/>
+          </p:cNvSpPr>
+          <p:nvPr>
+            <p:ph type="title"/>
+          </p:nvPr>
+        </p:nvSpPr>
+        <p:spPr>
+          <a:xfrm>
+            <a:off x="677334" y="609600"/>
+            <a:ext cx="8596668" cy="1032769"/>
+          </a:xfrm>
+        </p:spPr>
+        <p:txBody>
+          <a:bodyPr>
+            <a:normAutofit/>
+          </a:bodyPr>
+          <a:lstStyle/>
+          <a:p>
+            <a:r>
+              <a:rPr lang="en-US" sz="4400" dirty="0"/>
               <a:t>References</a:t>
             </a:r>
           </a:p>
@@ -9109,7 +9243,7 @@
 </p:sld>
 </file>
 
-<file path=ppt/slides/slide23.xml><?xml version="1.0" encoding="utf-8"?>
+<file path=ppt/slides/slide24.xml><?xml version="1.0" encoding="utf-8"?>
 <p:sld xmlns:a="http://schemas.openxmlformats.org/drawingml/2006/main" xmlns:r="http://schemas.openxmlformats.org/officeDocument/2006/relationships" xmlns:p="http://schemas.openxmlformats.org/presentationml/2006/main">
   <p:cSld>
     <p:spTree>

</xml_diff>